<commit_message>
Alteração DER e desenho solução.
</commit_message>
<xml_diff>
--- a/documentacao/SPRINT-2-diagrama-solucao-v1.pptx
+++ b/documentacao/SPRINT-2-diagrama-solucao-v1.pptx
@@ -260,7 +260,7 @@
           <a:p>
             <a:fld id="{DE8C9FCB-EA41-43C3-8D3E-1B7560132E20}" type="datetimeFigureOut">
               <a:rPr lang="pt-BR" smtClean="0"/>
-              <a:t>22/09/2019</a:t>
+              <a:t>23/09/2019</a:t>
             </a:fld>
             <a:endParaRPr lang="pt-BR"/>
           </a:p>
@@ -458,7 +458,7 @@
           <a:p>
             <a:fld id="{DE8C9FCB-EA41-43C3-8D3E-1B7560132E20}" type="datetimeFigureOut">
               <a:rPr lang="pt-BR" smtClean="0"/>
-              <a:t>22/09/2019</a:t>
+              <a:t>23/09/2019</a:t>
             </a:fld>
             <a:endParaRPr lang="pt-BR"/>
           </a:p>
@@ -666,7 +666,7 @@
           <a:p>
             <a:fld id="{DE8C9FCB-EA41-43C3-8D3E-1B7560132E20}" type="datetimeFigureOut">
               <a:rPr lang="pt-BR" smtClean="0"/>
-              <a:t>22/09/2019</a:t>
+              <a:t>23/09/2019</a:t>
             </a:fld>
             <a:endParaRPr lang="pt-BR"/>
           </a:p>
@@ -864,7 +864,7 @@
           <a:p>
             <a:fld id="{DE8C9FCB-EA41-43C3-8D3E-1B7560132E20}" type="datetimeFigureOut">
               <a:rPr lang="pt-BR" smtClean="0"/>
-              <a:t>22/09/2019</a:t>
+              <a:t>23/09/2019</a:t>
             </a:fld>
             <a:endParaRPr lang="pt-BR"/>
           </a:p>
@@ -1139,7 +1139,7 @@
           <a:p>
             <a:fld id="{DE8C9FCB-EA41-43C3-8D3E-1B7560132E20}" type="datetimeFigureOut">
               <a:rPr lang="pt-BR" smtClean="0"/>
-              <a:t>22/09/2019</a:t>
+              <a:t>23/09/2019</a:t>
             </a:fld>
             <a:endParaRPr lang="pt-BR"/>
           </a:p>
@@ -1404,7 +1404,7 @@
           <a:p>
             <a:fld id="{DE8C9FCB-EA41-43C3-8D3E-1B7560132E20}" type="datetimeFigureOut">
               <a:rPr lang="pt-BR" smtClean="0"/>
-              <a:t>22/09/2019</a:t>
+              <a:t>23/09/2019</a:t>
             </a:fld>
             <a:endParaRPr lang="pt-BR"/>
           </a:p>
@@ -1816,7 +1816,7 @@
           <a:p>
             <a:fld id="{DE8C9FCB-EA41-43C3-8D3E-1B7560132E20}" type="datetimeFigureOut">
               <a:rPr lang="pt-BR" smtClean="0"/>
-              <a:t>22/09/2019</a:t>
+              <a:t>23/09/2019</a:t>
             </a:fld>
             <a:endParaRPr lang="pt-BR"/>
           </a:p>
@@ -1957,7 +1957,7 @@
           <a:p>
             <a:fld id="{DE8C9FCB-EA41-43C3-8D3E-1B7560132E20}" type="datetimeFigureOut">
               <a:rPr lang="pt-BR" smtClean="0"/>
-              <a:t>22/09/2019</a:t>
+              <a:t>23/09/2019</a:t>
             </a:fld>
             <a:endParaRPr lang="pt-BR"/>
           </a:p>
@@ -2070,7 +2070,7 @@
           <a:p>
             <a:fld id="{DE8C9FCB-EA41-43C3-8D3E-1B7560132E20}" type="datetimeFigureOut">
               <a:rPr lang="pt-BR" smtClean="0"/>
-              <a:t>22/09/2019</a:t>
+              <a:t>23/09/2019</a:t>
             </a:fld>
             <a:endParaRPr lang="pt-BR"/>
           </a:p>
@@ -2381,7 +2381,7 @@
           <a:p>
             <a:fld id="{DE8C9FCB-EA41-43C3-8D3E-1B7560132E20}" type="datetimeFigureOut">
               <a:rPr lang="pt-BR" smtClean="0"/>
-              <a:t>22/09/2019</a:t>
+              <a:t>23/09/2019</a:t>
             </a:fld>
             <a:endParaRPr lang="pt-BR"/>
           </a:p>
@@ -2669,7 +2669,7 @@
           <a:p>
             <a:fld id="{DE8C9FCB-EA41-43C3-8D3E-1B7560132E20}" type="datetimeFigureOut">
               <a:rPr lang="pt-BR" smtClean="0"/>
-              <a:t>22/09/2019</a:t>
+              <a:t>23/09/2019</a:t>
             </a:fld>
             <a:endParaRPr lang="pt-BR"/>
           </a:p>
@@ -2910,7 +2910,7 @@
           <a:p>
             <a:fld id="{DE8C9FCB-EA41-43C3-8D3E-1B7560132E20}" type="datetimeFigureOut">
               <a:rPr lang="pt-BR" smtClean="0"/>
-              <a:t>22/09/2019</a:t>
+              <a:t>23/09/2019</a:t>
             </a:fld>
             <a:endParaRPr lang="pt-BR"/>
           </a:p>
@@ -3504,7 +3504,7 @@
           <p:nvPr/>
         </p:nvPicPr>
         <p:blipFill>
-          <a:blip r:embed="rId3">
+          <a:blip r:embed="rId3" cstate="hqprint">
             <a:extLst>
               <a:ext uri="{28A0092B-C50C-407E-A947-70E740481C1C}">
                 <a14:useLocalDpi xmlns:a14="http://schemas.microsoft.com/office/drawing/2010/main" val="0"/>
@@ -3540,7 +3540,7 @@
           <p:nvPr/>
         </p:nvPicPr>
         <p:blipFill>
-          <a:blip r:embed="rId4">
+          <a:blip r:embed="rId4" cstate="hqprint">
             <a:extLst>
               <a:ext uri="{28A0092B-C50C-407E-A947-70E740481C1C}">
                 <a14:useLocalDpi xmlns:a14="http://schemas.microsoft.com/office/drawing/2010/main" val="0"/>
@@ -3553,7 +3553,7 @@
         </p:blipFill>
         <p:spPr>
           <a:xfrm>
-            <a:off x="6878703" y="3546610"/>
+            <a:off x="10776513" y="2227028"/>
             <a:ext cx="790385" cy="790385"/>
           </a:xfrm>
           <a:prstGeom prst="rect">
@@ -3576,7 +3576,7 @@
           <p:nvPr/>
         </p:nvPicPr>
         <p:blipFill>
-          <a:blip r:embed="rId5">
+          <a:blip r:embed="rId5" cstate="hqprint">
             <a:extLst>
               <a:ext uri="{28A0092B-C50C-407E-A947-70E740481C1C}">
                 <a14:useLocalDpi xmlns:a14="http://schemas.microsoft.com/office/drawing/2010/main" val="0"/>
@@ -3589,7 +3589,7 @@
         </p:blipFill>
         <p:spPr>
           <a:xfrm>
-            <a:off x="10801213" y="2218305"/>
+            <a:off x="6926488" y="4764035"/>
             <a:ext cx="791680" cy="791680"/>
           </a:xfrm>
           <a:prstGeom prst="rect">
@@ -3612,7 +3612,7 @@
           <p:nvPr/>
         </p:nvPicPr>
         <p:blipFill>
-          <a:blip r:embed="rId6">
+          <a:blip r:embed="rId6" cstate="hqprint">
             <a:extLst>
               <a:ext uri="{28A0092B-C50C-407E-A947-70E740481C1C}">
                 <a14:useLocalDpi xmlns:a14="http://schemas.microsoft.com/office/drawing/2010/main" val="0"/>
@@ -3648,7 +3648,7 @@
           <p:nvPr/>
         </p:nvPicPr>
         <p:blipFill>
-          <a:blip r:embed="rId7">
+          <a:blip r:embed="rId7" cstate="hqprint">
             <a:extLst>
               <a:ext uri="{28A0092B-C50C-407E-A947-70E740481C1C}">
                 <a14:useLocalDpi xmlns:a14="http://schemas.microsoft.com/office/drawing/2010/main" val="0"/>
@@ -3684,7 +3684,7 @@
           <p:nvPr/>
         </p:nvPicPr>
         <p:blipFill>
-          <a:blip r:embed="rId8">
+          <a:blip r:embed="rId8" cstate="hqprint">
             <a:extLst>
               <a:ext uri="{28A0092B-C50C-407E-A947-70E740481C1C}">
                 <a14:useLocalDpi xmlns:a14="http://schemas.microsoft.com/office/drawing/2010/main" val="0"/>
@@ -3697,7 +3697,7 @@
         </p:blipFill>
         <p:spPr>
           <a:xfrm>
-            <a:off x="6790113" y="4039170"/>
+            <a:off x="6815512" y="5265374"/>
             <a:ext cx="998560" cy="998560"/>
           </a:xfrm>
           <a:prstGeom prst="rect">
@@ -3720,7 +3720,7 @@
           <p:nvPr/>
         </p:nvPicPr>
         <p:blipFill>
-          <a:blip r:embed="rId8">
+          <a:blip r:embed="rId8" cstate="hqprint">
             <a:extLst>
               <a:ext uri="{28A0092B-C50C-407E-A947-70E740481C1C}">
                 <a14:useLocalDpi xmlns:a14="http://schemas.microsoft.com/office/drawing/2010/main" val="0"/>
@@ -3756,7 +3756,7 @@
           <p:nvPr/>
         </p:nvPicPr>
         <p:blipFill>
-          <a:blip r:embed="rId8">
+          <a:blip r:embed="rId8" cstate="hqprint">
             <a:extLst>
               <a:ext uri="{28A0092B-C50C-407E-A947-70E740481C1C}">
                 <a14:useLocalDpi xmlns:a14="http://schemas.microsoft.com/office/drawing/2010/main" val="0"/>
@@ -3792,7 +3792,7 @@
           <p:nvPr/>
         </p:nvPicPr>
         <p:blipFill>
-          <a:blip r:embed="rId8">
+          <a:blip r:embed="rId8" cstate="hqprint">
             <a:extLst>
               <a:ext uri="{28A0092B-C50C-407E-A947-70E740481C1C}">
                 <a14:useLocalDpi xmlns:a14="http://schemas.microsoft.com/office/drawing/2010/main" val="0"/>
@@ -3828,7 +3828,7 @@
           <p:nvPr/>
         </p:nvPicPr>
         <p:blipFill>
-          <a:blip r:embed="rId8">
+          <a:blip r:embed="rId8" cstate="hqprint">
             <a:extLst>
               <a:ext uri="{28A0092B-C50C-407E-A947-70E740481C1C}">
                 <a14:useLocalDpi xmlns:a14="http://schemas.microsoft.com/office/drawing/2010/main" val="0"/>
@@ -3863,7 +3863,7 @@
         </p:nvSpPr>
         <p:spPr>
           <a:xfrm>
-            <a:off x="6299940" y="3139300"/>
+            <a:off x="6335449" y="6086958"/>
             <a:ext cx="1903021" cy="369332"/>
           </a:xfrm>
           <a:prstGeom prst="rect">
@@ -3960,7 +3960,7 @@
           <p:nvPr/>
         </p:nvPicPr>
         <p:blipFill>
-          <a:blip r:embed="rId9">
+          <a:blip r:embed="rId9" cstate="hqprint">
             <a:extLst>
               <a:ext uri="{28A0092B-C50C-407E-A947-70E740481C1C}">
                 <a14:useLocalDpi xmlns:a14="http://schemas.microsoft.com/office/drawing/2010/main" val="0"/>
@@ -4340,7 +4340,7 @@
           <p:nvPr/>
         </p:nvPicPr>
         <p:blipFill>
-          <a:blip r:embed="rId11" cstate="print">
+          <a:blip r:embed="rId11" cstate="hqprint">
             <a:extLst>
               <a:ext uri="{28A0092B-C50C-407E-A947-70E740481C1C}">
                 <a14:useLocalDpi xmlns:a14="http://schemas.microsoft.com/office/drawing/2010/main" val="0"/>
@@ -4572,7 +4572,7 @@
           <p:nvPr/>
         </p:nvPicPr>
         <p:blipFill rotWithShape="1">
-          <a:blip r:embed="rId16">
+          <a:blip r:embed="rId16" cstate="hqprint">
             <a:extLst>
               <a:ext uri="{28A0092B-C50C-407E-A947-70E740481C1C}">
                 <a14:useLocalDpi xmlns:a14="http://schemas.microsoft.com/office/drawing/2010/main" val="0"/>
@@ -4607,7 +4607,7 @@
           <p:nvPr/>
         </p:nvPicPr>
         <p:blipFill rotWithShape="1">
-          <a:blip r:embed="rId17">
+          <a:blip r:embed="rId17" cstate="hqprint">
             <a:extLst>
               <a:ext uri="{28A0092B-C50C-407E-A947-70E740481C1C}">
                 <a14:useLocalDpi xmlns:a14="http://schemas.microsoft.com/office/drawing/2010/main" val="0"/>
@@ -4642,7 +4642,7 @@
           <p:nvPr/>
         </p:nvPicPr>
         <p:blipFill rotWithShape="1">
-          <a:blip r:embed="rId18">
+          <a:blip r:embed="rId18" cstate="hqprint">
             <a:extLst>
               <a:ext uri="{28A0092B-C50C-407E-A947-70E740481C1C}">
                 <a14:useLocalDpi xmlns:a14="http://schemas.microsoft.com/office/drawing/2010/main" val="0"/>
@@ -4677,7 +4677,7 @@
           <p:nvPr/>
         </p:nvPicPr>
         <p:blipFill rotWithShape="1">
-          <a:blip r:embed="rId19">
+          <a:blip r:embed="rId19" cstate="hqprint">
             <a:extLst>
               <a:ext uri="{28A0092B-C50C-407E-A947-70E740481C1C}">
                 <a14:useLocalDpi xmlns:a14="http://schemas.microsoft.com/office/drawing/2010/main" val="0"/>
@@ -4712,7 +4712,7 @@
           <p:nvPr/>
         </p:nvPicPr>
         <p:blipFill rotWithShape="1">
-          <a:blip r:embed="rId20">
+          <a:blip r:embed="rId20" cstate="hqprint">
             <a:extLst>
               <a:ext uri="{28A0092B-C50C-407E-A947-70E740481C1C}">
                 <a14:useLocalDpi xmlns:a14="http://schemas.microsoft.com/office/drawing/2010/main" val="0"/>
@@ -4791,7 +4791,7 @@
           <p:nvPr/>
         </p:nvPicPr>
         <p:blipFill rotWithShape="1">
-          <a:blip r:embed="rId21">
+          <a:blip r:embed="rId21" cstate="hqprint">
             <a:extLst>
               <a:ext uri="{28A0092B-C50C-407E-A947-70E740481C1C}">
                 <a14:useLocalDpi xmlns:a14="http://schemas.microsoft.com/office/drawing/2010/main" val="0"/>
@@ -5056,7 +5056,7 @@
           <p:nvPr/>
         </p:nvPicPr>
         <p:blipFill>
-          <a:blip r:embed="rId22">
+          <a:blip r:embed="rId22" cstate="hqprint">
             <a:extLst>
               <a:ext uri="{28A0092B-C50C-407E-A947-70E740481C1C}">
                 <a14:useLocalDpi xmlns:a14="http://schemas.microsoft.com/office/drawing/2010/main" val="0"/>
@@ -5092,7 +5092,7 @@
           <p:nvPr/>
         </p:nvPicPr>
         <p:blipFill>
-          <a:blip r:embed="rId23">
+          <a:blip r:embed="rId23" cstate="hqprint">
             <a:extLst>
               <a:ext uri="{28A0092B-C50C-407E-A947-70E740481C1C}">
                 <a14:useLocalDpi xmlns:a14="http://schemas.microsoft.com/office/drawing/2010/main" val="0"/>
@@ -5278,42 +5278,6 @@
           </a:fontRef>
         </p:style>
       </p:cxnSp>
-      <p:pic>
-        <p:nvPicPr>
-          <p:cNvPr id="120" name="Imagem 119">
-            <a:extLst>
-              <a:ext uri="{FF2B5EF4-FFF2-40B4-BE49-F238E27FC236}">
-                <a16:creationId xmlns:a16="http://schemas.microsoft.com/office/drawing/2014/main" id="{6A26E7A8-FBB5-4E65-9510-7C21682DDADC}"/>
-              </a:ext>
-            </a:extLst>
-          </p:cNvPr>
-          <p:cNvPicPr>
-            <a:picLocks noChangeAspect="1"/>
-          </p:cNvPicPr>
-          <p:nvPr/>
-        </p:nvPicPr>
-        <p:blipFill>
-          <a:blip r:embed="rId25">
-            <a:extLst>
-              <a:ext uri="{28A0092B-C50C-407E-A947-70E740481C1C}">
-                <a14:useLocalDpi xmlns:a14="http://schemas.microsoft.com/office/drawing/2010/main" val="0"/>
-              </a:ext>
-            </a:extLst>
-          </a:blip>
-          <a:stretch>
-            <a:fillRect/>
-          </a:stretch>
-        </p:blipFill>
-        <p:spPr>
-          <a:xfrm>
-            <a:off x="5503203" y="4094995"/>
-            <a:ext cx="916285" cy="916285"/>
-          </a:xfrm>
-          <a:prstGeom prst="rect">
-            <a:avLst/>
-          </a:prstGeom>
-        </p:spPr>
-      </p:pic>
       <p:sp>
         <p:nvSpPr>
           <p:cNvPr id="121" name="Retângulo de cantos arredondados 35">
@@ -5408,7 +5372,7 @@
           <a:lstStyle/>
           <a:p>
             <a:r>
-              <a:rPr lang="pt-BR" b="1" dirty="0">
+              <a:rPr lang="pt-BR" b="1" dirty="0" smtClean="0">
                 <a:solidFill>
                   <a:schemeClr val="accent5">
                     <a:lumMod val="75000"/>
@@ -5417,7 +5381,7 @@
                 <a:latin typeface="Arial" panose="020B0604020202020204" pitchFamily="34" charset="0"/>
                 <a:cs typeface="Arial" panose="020B0604020202020204" pitchFamily="34" charset="0"/>
               </a:rPr>
-              <a:t>DATASOURCE</a:t>
+              <a:t>REDE LOCAL</a:t>
             </a:r>
             <a:endParaRPr lang="pt-BR" dirty="0">
               <a:latin typeface="Arial" panose="020B0604020202020204" pitchFamily="34" charset="0"/>
@@ -5439,9 +5403,9 @@
           <p:nvPr/>
         </p:nvSpPr>
         <p:spPr>
-          <a:xfrm flipH="1" flipV="1">
-            <a:off x="6414455" y="5073473"/>
-            <a:ext cx="1658320" cy="1800880"/>
+          <a:xfrm rot="5400000" flipH="1" flipV="1">
+            <a:off x="5263904" y="4568642"/>
+            <a:ext cx="1156968" cy="1209271"/>
           </a:xfrm>
           <a:prstGeom prst="wedgeRectCallout">
             <a:avLst/>
@@ -5501,7 +5465,7 @@
           <p:nvPr/>
         </p:nvPicPr>
         <p:blipFill>
-          <a:blip r:embed="rId26">
+          <a:blip r:embed="rId25" cstate="hqprint">
             <a:extLst>
               <a:ext uri="{28A0092B-C50C-407E-A947-70E740481C1C}">
                 <a14:useLocalDpi xmlns:a14="http://schemas.microsoft.com/office/drawing/2010/main" val="0"/>
@@ -5514,8 +5478,8 @@
         </p:blipFill>
         <p:spPr>
           <a:xfrm>
-            <a:off x="6519102" y="5270246"/>
-            <a:ext cx="1449027" cy="1449027"/>
+            <a:off x="5350314" y="4720078"/>
+            <a:ext cx="1023624" cy="1023624"/>
           </a:xfrm>
           <a:prstGeom prst="rect">
             <a:avLst/>
@@ -5524,88 +5488,6 @@
       </p:pic>
       <p:sp>
         <p:nvSpPr>
-          <p:cNvPr id="124" name="CaixaDeTexto 123">
-            <a:extLst>
-              <a:ext uri="{FF2B5EF4-FFF2-40B4-BE49-F238E27FC236}">
-                <a16:creationId xmlns:a16="http://schemas.microsoft.com/office/drawing/2014/main" id="{85A0D3AA-7DA8-4BB6-A2F7-B0C9479944D8}"/>
-              </a:ext>
-            </a:extLst>
-          </p:cNvPr>
-          <p:cNvSpPr txBox="1"/>
-          <p:nvPr/>
-        </p:nvSpPr>
-        <p:spPr>
-          <a:xfrm>
-            <a:off x="5649746" y="4285152"/>
-            <a:ext cx="599849" cy="307777"/>
-          </a:xfrm>
-          <a:prstGeom prst="rect">
-            <a:avLst/>
-          </a:prstGeom>
-          <a:noFill/>
-        </p:spPr>
-        <p:txBody>
-          <a:bodyPr wrap="square" rtlCol="0">
-            <a:spAutoFit/>
-          </a:bodyPr>
-          <a:lstStyle/>
-          <a:p>
-            <a:pPr algn="ctr"/>
-            <a:r>
-              <a:rPr lang="pt-BR" sz="1400" dirty="0">
-                <a:latin typeface="Arial" panose="020B0604020202020204" pitchFamily="34" charset="0"/>
-                <a:cs typeface="Arial" panose="020B0604020202020204" pitchFamily="34" charset="0"/>
-              </a:rPr>
-              <a:t>SVR</a:t>
-            </a:r>
-          </a:p>
-        </p:txBody>
-      </p:sp>
-      <p:cxnSp>
-        <p:nvCxnSpPr>
-          <p:cNvPr id="126" name="Conector de Seta Reta 125">
-            <a:extLst>
-              <a:ext uri="{FF2B5EF4-FFF2-40B4-BE49-F238E27FC236}">
-                <a16:creationId xmlns:a16="http://schemas.microsoft.com/office/drawing/2014/main" id="{A6E406F4-63A2-4354-8462-05776359A025}"/>
-              </a:ext>
-            </a:extLst>
-          </p:cNvPr>
-          <p:cNvCxnSpPr>
-            <a:stCxn id="120" idx="3"/>
-            <a:endCxn id="67" idx="1"/>
-          </p:cNvCxnSpPr>
-          <p:nvPr/>
-        </p:nvCxnSpPr>
-        <p:spPr>
-          <a:xfrm flipV="1">
-            <a:off x="6419488" y="4538450"/>
-            <a:ext cx="370625" cy="14688"/>
-          </a:xfrm>
-          <a:prstGeom prst="straightConnector1">
-            <a:avLst/>
-          </a:prstGeom>
-          <a:ln>
-            <a:headEnd type="triangle"/>
-            <a:tailEnd type="triangle"/>
-          </a:ln>
-        </p:spPr>
-        <p:style>
-          <a:lnRef idx="1">
-            <a:schemeClr val="accent1"/>
-          </a:lnRef>
-          <a:fillRef idx="0">
-            <a:schemeClr val="accent1"/>
-          </a:fillRef>
-          <a:effectRef idx="0">
-            <a:schemeClr val="accent1"/>
-          </a:effectRef>
-          <a:fontRef idx="minor">
-            <a:schemeClr val="tx1"/>
-          </a:fontRef>
-        </p:style>
-      </p:cxnSp>
-      <p:sp>
-        <p:nvSpPr>
           <p:cNvPr id="127" name="Balão de Fala: Retângulo 126">
             <a:extLst>
               <a:ext uri="{FF2B5EF4-FFF2-40B4-BE49-F238E27FC236}">
@@ -5618,11 +5500,14 @@
         </p:nvSpPr>
         <p:spPr>
           <a:xfrm rot="16200000" flipH="1">
-            <a:off x="1445204" y="2758273"/>
+            <a:off x="1481224" y="2362292"/>
             <a:ext cx="2549545" cy="4428613"/>
           </a:xfrm>
           <a:prstGeom prst="wedgeRectCallout">
-            <a:avLst/>
+            <a:avLst>
+              <a:gd name="adj1" fmla="val -19339"/>
+              <a:gd name="adj2" fmla="val 84008"/>
+            </a:avLst>
           </a:prstGeom>
           <a:solidFill>
             <a:srgbClr val="D5DCED">
@@ -5680,13 +5565,14 @@
           </p:cNvPr>
           <p:cNvCxnSpPr>
             <a:cxnSpLocks/>
+            <a:stCxn id="83" idx="3"/>
           </p:cNvCxnSpPr>
           <p:nvPr/>
         </p:nvCxnSpPr>
         <p:spPr>
-          <a:xfrm flipV="1">
-            <a:off x="7733993" y="3941802"/>
-            <a:ext cx="1096522" cy="440190"/>
+          <a:xfrm>
+            <a:off x="7858539" y="3919582"/>
+            <a:ext cx="971976" cy="22220"/>
           </a:xfrm>
           <a:prstGeom prst="straightConnector1">
             <a:avLst/>
@@ -5725,7 +5611,7 @@
         </p:nvSpPr>
         <p:spPr>
           <a:xfrm>
-            <a:off x="599105" y="3836990"/>
+            <a:off x="635125" y="3441009"/>
             <a:ext cx="3961406" cy="2019383"/>
           </a:xfrm>
           <a:prstGeom prst="rect">
@@ -5777,7 +5663,7 @@
         </p:nvCxnSpPr>
         <p:spPr>
           <a:xfrm>
-            <a:off x="4074737" y="6004465"/>
+            <a:off x="4110757" y="5608484"/>
             <a:ext cx="614110" cy="0"/>
           </a:xfrm>
           <a:prstGeom prst="line">
@@ -5815,7 +5701,7 @@
         </p:nvCxnSpPr>
         <p:spPr>
           <a:xfrm>
-            <a:off x="4688847" y="5389782"/>
+            <a:off x="4724867" y="4993801"/>
             <a:ext cx="1" cy="614683"/>
           </a:xfrm>
           <a:prstGeom prst="line">
@@ -5853,7 +5739,7 @@
         </p:nvCxnSpPr>
         <p:spPr>
           <a:xfrm>
-            <a:off x="4074737" y="6156865"/>
+            <a:off x="4110757" y="5760884"/>
             <a:ext cx="766510" cy="0"/>
           </a:xfrm>
           <a:prstGeom prst="line">
@@ -5891,7 +5777,7 @@
         </p:nvCxnSpPr>
         <p:spPr>
           <a:xfrm>
-            <a:off x="4841248" y="5373740"/>
+            <a:off x="4877268" y="4977759"/>
             <a:ext cx="0" cy="783125"/>
           </a:xfrm>
           <a:prstGeom prst="line">
@@ -5927,7 +5813,7 @@
         </p:nvSpPr>
         <p:spPr>
           <a:xfrm>
-            <a:off x="4336218" y="5585876"/>
+            <a:off x="4372238" y="5189895"/>
             <a:ext cx="216520" cy="276999"/>
           </a:xfrm>
           <a:prstGeom prst="rect">
@@ -5977,7 +5863,7 @@
         </p:nvSpPr>
         <p:spPr>
           <a:xfrm>
-            <a:off x="4617519" y="5931107"/>
+            <a:off x="4653539" y="5535126"/>
             <a:ext cx="216520" cy="276999"/>
           </a:xfrm>
           <a:prstGeom prst="rect">
@@ -6027,7 +5913,7 @@
         </p:nvSpPr>
         <p:spPr>
           <a:xfrm>
-            <a:off x="4520702" y="5754318"/>
+            <a:off x="4556722" y="5358337"/>
             <a:ext cx="216520" cy="276999"/>
           </a:xfrm>
           <a:prstGeom prst="rect">
@@ -6077,7 +5963,7 @@
         </p:nvSpPr>
         <p:spPr>
           <a:xfrm>
-            <a:off x="756870" y="3989391"/>
+            <a:off x="792890" y="3593410"/>
             <a:ext cx="3649641" cy="1487722"/>
           </a:xfrm>
           <a:prstGeom prst="rect">
@@ -6127,7 +6013,7 @@
         </p:nvSpPr>
         <p:spPr>
           <a:xfrm>
-            <a:off x="569681" y="5555856"/>
+            <a:off x="605701" y="5159875"/>
             <a:ext cx="953918" cy="276999"/>
           </a:xfrm>
           <a:prstGeom prst="rect">
@@ -6178,7 +6064,7 @@
         </p:nvSpPr>
         <p:spPr>
           <a:xfrm>
-            <a:off x="909271" y="4141791"/>
+            <a:off x="945291" y="3745810"/>
             <a:ext cx="3315260" cy="983452"/>
           </a:xfrm>
           <a:prstGeom prst="rect">
@@ -6228,7 +6114,7 @@
         </p:nvSpPr>
         <p:spPr>
           <a:xfrm>
-            <a:off x="740475" y="5160264"/>
+            <a:off x="776495" y="4764283"/>
             <a:ext cx="953918" cy="276999"/>
           </a:xfrm>
           <a:prstGeom prst="rect">
@@ -6279,7 +6165,7 @@
         </p:nvSpPr>
         <p:spPr>
           <a:xfrm>
-            <a:off x="900601" y="4810535"/>
+            <a:off x="936621" y="4414554"/>
             <a:ext cx="953918" cy="276999"/>
           </a:xfrm>
           <a:prstGeom prst="rect">
@@ -6330,7 +6216,7 @@
           <p:nvPr/>
         </p:nvPicPr>
         <p:blipFill>
-          <a:blip r:embed="rId27">
+          <a:blip r:embed="rId26" cstate="hqprint">
             <a:extLst>
               <a:ext uri="{28A0092B-C50C-407E-A947-70E740481C1C}">
                 <a14:useLocalDpi xmlns:a14="http://schemas.microsoft.com/office/drawing/2010/main" val="0"/>
@@ -6343,7 +6229,7 @@
         </p:blipFill>
         <p:spPr>
           <a:xfrm>
-            <a:off x="839390" y="4169362"/>
+            <a:off x="875410" y="3773381"/>
             <a:ext cx="578606" cy="578606"/>
           </a:xfrm>
           <a:prstGeom prst="rect">
@@ -6365,7 +6251,7 @@
         </p:nvSpPr>
         <p:spPr>
           <a:xfrm>
-            <a:off x="1500516" y="4268124"/>
+            <a:off x="1536536" y="3872143"/>
             <a:ext cx="678282" cy="315261"/>
           </a:xfrm>
           <a:prstGeom prst="rect">
@@ -6426,7 +6312,7 @@
         </p:nvSpPr>
         <p:spPr>
           <a:xfrm>
-            <a:off x="1488281" y="4692287"/>
+            <a:off x="1524301" y="4296306"/>
             <a:ext cx="678282" cy="315261"/>
           </a:xfrm>
           <a:prstGeom prst="rect">
@@ -6487,7 +6373,7 @@
         </p:nvSpPr>
         <p:spPr>
           <a:xfrm>
-            <a:off x="2395970" y="4268124"/>
+            <a:off x="2431990" y="3872143"/>
             <a:ext cx="678282" cy="315261"/>
           </a:xfrm>
           <a:prstGeom prst="rect">
@@ -6548,7 +6434,7 @@
         </p:nvSpPr>
         <p:spPr>
           <a:xfrm>
-            <a:off x="2396405" y="4691723"/>
+            <a:off x="2432425" y="4295742"/>
             <a:ext cx="678282" cy="315261"/>
           </a:xfrm>
           <a:prstGeom prst="rect">
@@ -6609,7 +6495,7 @@
         </p:nvSpPr>
         <p:spPr>
           <a:xfrm>
-            <a:off x="3292423" y="4270808"/>
+            <a:off x="3328443" y="3874827"/>
             <a:ext cx="678282" cy="315261"/>
           </a:xfrm>
           <a:prstGeom prst="rect">
@@ -6670,7 +6556,7 @@
         </p:nvSpPr>
         <p:spPr>
           <a:xfrm>
-            <a:off x="3292423" y="4691723"/>
+            <a:off x="3328443" y="4295742"/>
             <a:ext cx="678282" cy="315261"/>
           </a:xfrm>
           <a:prstGeom prst="rect">
@@ -6843,6 +6729,81 @@
           </a:fontRef>
         </p:style>
       </p:cxnSp>
+      <p:pic>
+        <p:nvPicPr>
+          <p:cNvPr id="83" name="Imagem 82">
+            <a:extLst>
+              <a:ext uri="{FF2B5EF4-FFF2-40B4-BE49-F238E27FC236}">
+                <a16:creationId xmlns:a16="http://schemas.microsoft.com/office/drawing/2014/main" id="{6A26E7A8-FBB5-4E65-9510-7C21682DDADC}"/>
+              </a:ext>
+            </a:extLst>
+          </p:cNvPr>
+          <p:cNvPicPr>
+            <a:picLocks noChangeAspect="1"/>
+          </p:cNvPicPr>
+          <p:nvPr/>
+        </p:nvPicPr>
+        <p:blipFill>
+          <a:blip r:embed="rId27" cstate="hqprint">
+            <a:extLst>
+              <a:ext uri="{28A0092B-C50C-407E-A947-70E740481C1C}">
+                <a14:useLocalDpi xmlns:a14="http://schemas.microsoft.com/office/drawing/2010/main" val="0"/>
+              </a:ext>
+            </a:extLst>
+          </a:blip>
+          <a:stretch>
+            <a:fillRect/>
+          </a:stretch>
+        </p:blipFill>
+        <p:spPr>
+          <a:xfrm>
+            <a:off x="6456982" y="3218803"/>
+            <a:ext cx="1401557" cy="1401557"/>
+          </a:xfrm>
+          <a:prstGeom prst="rect">
+            <a:avLst/>
+          </a:prstGeom>
+        </p:spPr>
+      </p:pic>
+      <p:sp>
+        <p:nvSpPr>
+          <p:cNvPr id="84" name="CaixaDeTexto 83">
+            <a:extLst>
+              <a:ext uri="{FF2B5EF4-FFF2-40B4-BE49-F238E27FC236}">
+                <a16:creationId xmlns:a16="http://schemas.microsoft.com/office/drawing/2014/main" id="{85A0D3AA-7DA8-4BB6-A2F7-B0C9479944D8}"/>
+              </a:ext>
+            </a:extLst>
+          </p:cNvPr>
+          <p:cNvSpPr txBox="1"/>
+          <p:nvPr/>
+        </p:nvSpPr>
+        <p:spPr>
+          <a:xfrm>
+            <a:off x="6677627" y="3621230"/>
+            <a:ext cx="917534" cy="307777"/>
+          </a:xfrm>
+          <a:prstGeom prst="rect">
+            <a:avLst/>
+          </a:prstGeom>
+          <a:noFill/>
+        </p:spPr>
+        <p:txBody>
+          <a:bodyPr wrap="square" rtlCol="0">
+            <a:spAutoFit/>
+          </a:bodyPr>
+          <a:lstStyle/>
+          <a:p>
+            <a:pPr algn="ctr"/>
+            <a:r>
+              <a:rPr lang="pt-BR" sz="1400" dirty="0">
+                <a:latin typeface="Arial" panose="020B0604020202020204" pitchFamily="34" charset="0"/>
+                <a:cs typeface="Arial" panose="020B0604020202020204" pitchFamily="34" charset="0"/>
+              </a:rPr>
+              <a:t>SVR</a:t>
+            </a:r>
+          </a:p>
+        </p:txBody>
+      </p:sp>
     </p:spTree>
     <p:extLst>
       <p:ext uri="{BB962C8B-B14F-4D97-AF65-F5344CB8AC3E}">
@@ -6853,6 +6814,13 @@
   <p:clrMapOvr>
     <a:masterClrMapping/>
   </p:clrMapOvr>
+  <p:timing>
+    <p:tnLst>
+      <p:par>
+        <p:cTn id="1" dur="indefinite" restart="never" nodeType="tmRoot"/>
+      </p:par>
+    </p:tnLst>
+  </p:timing>
 </p:sld>
 </file>
 
@@ -8453,7 +8421,7 @@
           <p:nvPr/>
         </p:nvPicPr>
         <p:blipFill>
-          <a:blip r:embed="rId9" cstate="print">
+          <a:blip r:embed="rId9" cstate="hqprint">
             <a:extLst>
               <a:ext uri="{28A0092B-C50C-407E-A947-70E740481C1C}">
                 <a14:useLocalDpi xmlns:a14="http://schemas.microsoft.com/office/drawing/2010/main" val="0"/>
@@ -9338,6 +9306,13 @@
   <p:clrMapOvr>
     <a:masterClrMapping/>
   </p:clrMapOvr>
+  <p:timing>
+    <p:tnLst>
+      <p:par>
+        <p:cTn id="1" dur="indefinite" restart="never" nodeType="tmRoot"/>
+      </p:par>
+    </p:tnLst>
+  </p:timing>
 </p:sld>
 </file>
 

</xml_diff>

<commit_message>
Alteração do desenho da solução.
</commit_message>
<xml_diff>
--- a/documentacao/SPRINT-2-diagrama-solucao-v1.pptx
+++ b/documentacao/SPRINT-2-diagrama-solucao-v1.pptx
@@ -6,7 +6,6 @@
   </p:sldMasterIdLst>
   <p:sldIdLst>
     <p:sldId id="258" r:id="rId2"/>
-    <p:sldId id="256" r:id="rId3"/>
   </p:sldIdLst>
   <p:sldSz cx="12192000" cy="6858000"/>
   <p:notesSz cx="6858000" cy="9144000"/>
@@ -260,7 +259,7 @@
           <a:p>
             <a:fld id="{DE8C9FCB-EA41-43C3-8D3E-1B7560132E20}" type="datetimeFigureOut">
               <a:rPr lang="pt-BR" smtClean="0"/>
-              <a:t>23/09/2019</a:t>
+              <a:t>03/10/2019</a:t>
             </a:fld>
             <a:endParaRPr lang="pt-BR"/>
           </a:p>
@@ -458,7 +457,7 @@
           <a:p>
             <a:fld id="{DE8C9FCB-EA41-43C3-8D3E-1B7560132E20}" type="datetimeFigureOut">
               <a:rPr lang="pt-BR" smtClean="0"/>
-              <a:t>23/09/2019</a:t>
+              <a:t>03/10/2019</a:t>
             </a:fld>
             <a:endParaRPr lang="pt-BR"/>
           </a:p>
@@ -666,7 +665,7 @@
           <a:p>
             <a:fld id="{DE8C9FCB-EA41-43C3-8D3E-1B7560132E20}" type="datetimeFigureOut">
               <a:rPr lang="pt-BR" smtClean="0"/>
-              <a:t>23/09/2019</a:t>
+              <a:t>03/10/2019</a:t>
             </a:fld>
             <a:endParaRPr lang="pt-BR"/>
           </a:p>
@@ -864,7 +863,7 @@
           <a:p>
             <a:fld id="{DE8C9FCB-EA41-43C3-8D3E-1B7560132E20}" type="datetimeFigureOut">
               <a:rPr lang="pt-BR" smtClean="0"/>
-              <a:t>23/09/2019</a:t>
+              <a:t>03/10/2019</a:t>
             </a:fld>
             <a:endParaRPr lang="pt-BR"/>
           </a:p>
@@ -1139,7 +1138,7 @@
           <a:p>
             <a:fld id="{DE8C9FCB-EA41-43C3-8D3E-1B7560132E20}" type="datetimeFigureOut">
               <a:rPr lang="pt-BR" smtClean="0"/>
-              <a:t>23/09/2019</a:t>
+              <a:t>03/10/2019</a:t>
             </a:fld>
             <a:endParaRPr lang="pt-BR"/>
           </a:p>
@@ -1404,7 +1403,7 @@
           <a:p>
             <a:fld id="{DE8C9FCB-EA41-43C3-8D3E-1B7560132E20}" type="datetimeFigureOut">
               <a:rPr lang="pt-BR" smtClean="0"/>
-              <a:t>23/09/2019</a:t>
+              <a:t>03/10/2019</a:t>
             </a:fld>
             <a:endParaRPr lang="pt-BR"/>
           </a:p>
@@ -1816,7 +1815,7 @@
           <a:p>
             <a:fld id="{DE8C9FCB-EA41-43C3-8D3E-1B7560132E20}" type="datetimeFigureOut">
               <a:rPr lang="pt-BR" smtClean="0"/>
-              <a:t>23/09/2019</a:t>
+              <a:t>03/10/2019</a:t>
             </a:fld>
             <a:endParaRPr lang="pt-BR"/>
           </a:p>
@@ -1957,7 +1956,7 @@
           <a:p>
             <a:fld id="{DE8C9FCB-EA41-43C3-8D3E-1B7560132E20}" type="datetimeFigureOut">
               <a:rPr lang="pt-BR" smtClean="0"/>
-              <a:t>23/09/2019</a:t>
+              <a:t>03/10/2019</a:t>
             </a:fld>
             <a:endParaRPr lang="pt-BR"/>
           </a:p>
@@ -2070,7 +2069,7 @@
           <a:p>
             <a:fld id="{DE8C9FCB-EA41-43C3-8D3E-1B7560132E20}" type="datetimeFigureOut">
               <a:rPr lang="pt-BR" smtClean="0"/>
-              <a:t>23/09/2019</a:t>
+              <a:t>03/10/2019</a:t>
             </a:fld>
             <a:endParaRPr lang="pt-BR"/>
           </a:p>
@@ -2381,7 +2380,7 @@
           <a:p>
             <a:fld id="{DE8C9FCB-EA41-43C3-8D3E-1B7560132E20}" type="datetimeFigureOut">
               <a:rPr lang="pt-BR" smtClean="0"/>
-              <a:t>23/09/2019</a:t>
+              <a:t>03/10/2019</a:t>
             </a:fld>
             <a:endParaRPr lang="pt-BR"/>
           </a:p>
@@ -2669,7 +2668,7 @@
           <a:p>
             <a:fld id="{DE8C9FCB-EA41-43C3-8D3E-1B7560132E20}" type="datetimeFigureOut">
               <a:rPr lang="pt-BR" smtClean="0"/>
-              <a:t>23/09/2019</a:t>
+              <a:t>03/10/2019</a:t>
             </a:fld>
             <a:endParaRPr lang="pt-BR"/>
           </a:p>
@@ -2910,7 +2909,7 @@
           <a:p>
             <a:fld id="{DE8C9FCB-EA41-43C3-8D3E-1B7560132E20}" type="datetimeFigureOut">
               <a:rPr lang="pt-BR" smtClean="0"/>
-              <a:t>23/09/2019</a:t>
+              <a:t>03/10/2019</a:t>
             </a:fld>
             <a:endParaRPr lang="pt-BR"/>
           </a:p>
@@ -6824,2498 +6823,6 @@
 </p:sld>
 </file>
 
-<file path=ppt/slides/slide2.xml><?xml version="1.0" encoding="utf-8"?>
-<p:sld xmlns:a="http://schemas.openxmlformats.org/drawingml/2006/main" xmlns:r="http://schemas.openxmlformats.org/officeDocument/2006/relationships" xmlns:p="http://schemas.openxmlformats.org/presentationml/2006/main">
-  <p:cSld>
-    <p:spTree>
-      <p:nvGrpSpPr>
-        <p:cNvPr id="1" name=""/>
-        <p:cNvGrpSpPr/>
-        <p:nvPr/>
-      </p:nvGrpSpPr>
-      <p:grpSpPr>
-        <a:xfrm>
-          <a:off x="0" y="0"/>
-          <a:ext cx="0" cy="0"/>
-          <a:chOff x="0" y="0"/>
-          <a:chExt cx="0" cy="0"/>
-        </a:xfrm>
-      </p:grpSpPr>
-      <p:sp>
-        <p:nvSpPr>
-          <p:cNvPr id="4" name="Retângulo de cantos arredondados 35">
-            <a:extLst>
-              <a:ext uri="{FF2B5EF4-FFF2-40B4-BE49-F238E27FC236}">
-                <a16:creationId xmlns:a16="http://schemas.microsoft.com/office/drawing/2014/main" id="{488E423F-8E49-4821-BA1C-067F9B39A8F5}"/>
-              </a:ext>
-            </a:extLst>
-          </p:cNvPr>
-          <p:cNvSpPr/>
-          <p:nvPr/>
-        </p:nvSpPr>
-        <p:spPr>
-          <a:xfrm>
-            <a:off x="4083436" y="1805663"/>
-            <a:ext cx="4566412" cy="3281031"/>
-          </a:xfrm>
-          <a:prstGeom prst="roundRect">
-            <a:avLst/>
-          </a:prstGeom>
-          <a:noFill/>
-          <a:ln w="28575">
-            <a:solidFill>
-              <a:schemeClr val="bg1">
-                <a:lumMod val="65000"/>
-              </a:schemeClr>
-            </a:solidFill>
-            <a:prstDash val="sysDash"/>
-          </a:ln>
-        </p:spPr>
-        <p:style>
-          <a:lnRef idx="2">
-            <a:schemeClr val="accent1">
-              <a:shade val="50000"/>
-            </a:schemeClr>
-          </a:lnRef>
-          <a:fillRef idx="1">
-            <a:schemeClr val="accent1"/>
-          </a:fillRef>
-          <a:effectRef idx="0">
-            <a:schemeClr val="accent1"/>
-          </a:effectRef>
-          <a:fontRef idx="minor">
-            <a:schemeClr val="lt1"/>
-          </a:fontRef>
-        </p:style>
-        <p:txBody>
-          <a:bodyPr rtlCol="0" anchor="t" anchorCtr="1"/>
-          <a:lstStyle/>
-          <a:p>
-            <a:pPr algn="ctr"/>
-            <a:endParaRPr lang="pt-BR" sz="1400" b="1" dirty="0">
-              <a:solidFill>
-                <a:schemeClr val="accent5">
-                  <a:lumMod val="75000"/>
-                </a:schemeClr>
-              </a:solidFill>
-            </a:endParaRPr>
-          </a:p>
-        </p:txBody>
-      </p:sp>
-      <p:sp>
-        <p:nvSpPr>
-          <p:cNvPr id="5" name="Retângulo 4">
-            <a:extLst>
-              <a:ext uri="{FF2B5EF4-FFF2-40B4-BE49-F238E27FC236}">
-                <a16:creationId xmlns:a16="http://schemas.microsoft.com/office/drawing/2014/main" id="{1ED0C953-6B79-40A3-9F87-16FB8179BB88}"/>
-              </a:ext>
-            </a:extLst>
-          </p:cNvPr>
-          <p:cNvSpPr/>
-          <p:nvPr/>
-        </p:nvSpPr>
-        <p:spPr>
-          <a:xfrm>
-            <a:off x="4588109" y="4817499"/>
-            <a:ext cx="3608966" cy="500389"/>
-          </a:xfrm>
-          <a:prstGeom prst="rect">
-            <a:avLst/>
-          </a:prstGeom>
-          <a:solidFill>
-            <a:schemeClr val="bg1"/>
-          </a:solidFill>
-          <a:ln>
-            <a:noFill/>
-          </a:ln>
-        </p:spPr>
-        <p:style>
-          <a:lnRef idx="2">
-            <a:schemeClr val="accent6"/>
-          </a:lnRef>
-          <a:fillRef idx="1">
-            <a:schemeClr val="lt1"/>
-          </a:fillRef>
-          <a:effectRef idx="0">
-            <a:schemeClr val="accent6"/>
-          </a:effectRef>
-          <a:fontRef idx="minor">
-            <a:schemeClr val="dk1"/>
-          </a:fontRef>
-        </p:style>
-        <p:txBody>
-          <a:bodyPr rtlCol="0" anchor="ctr"/>
-          <a:lstStyle/>
-          <a:p>
-            <a:pPr algn="ctr"/>
-            <a:endParaRPr lang="pt-BR"/>
-          </a:p>
-        </p:txBody>
-      </p:sp>
-      <p:pic>
-        <p:nvPicPr>
-          <p:cNvPr id="6" name="Imagem 5">
-            <a:extLst>
-              <a:ext uri="{FF2B5EF4-FFF2-40B4-BE49-F238E27FC236}">
-                <a16:creationId xmlns:a16="http://schemas.microsoft.com/office/drawing/2014/main" id="{7F0EB43C-42DE-4BF9-8FE0-8D4C7A5B3D44}"/>
-              </a:ext>
-            </a:extLst>
-          </p:cNvPr>
-          <p:cNvPicPr>
-            <a:picLocks noChangeAspect="1"/>
-          </p:cNvPicPr>
-          <p:nvPr/>
-        </p:nvPicPr>
-        <p:blipFill>
-          <a:blip r:embed="rId2">
-            <a:extLst>
-              <a:ext uri="{28A0092B-C50C-407E-A947-70E740481C1C}">
-                <a14:useLocalDpi xmlns:a14="http://schemas.microsoft.com/office/drawing/2010/main" val="0"/>
-              </a:ext>
-            </a:extLst>
-          </a:blip>
-          <a:stretch>
-            <a:fillRect/>
-          </a:stretch>
-        </p:blipFill>
-        <p:spPr>
-          <a:xfrm>
-            <a:off x="4581143" y="2893347"/>
-            <a:ext cx="3638184" cy="3618275"/>
-          </a:xfrm>
-          <a:prstGeom prst="rect">
-            <a:avLst/>
-          </a:prstGeom>
-        </p:spPr>
-      </p:pic>
-      <p:pic>
-        <p:nvPicPr>
-          <p:cNvPr id="7" name="Imagem 6">
-            <a:extLst>
-              <a:ext uri="{FF2B5EF4-FFF2-40B4-BE49-F238E27FC236}">
-                <a16:creationId xmlns:a16="http://schemas.microsoft.com/office/drawing/2014/main" id="{741E1BBB-3498-47F1-9EDC-DB36948BB5FA}"/>
-              </a:ext>
-            </a:extLst>
-          </p:cNvPr>
-          <p:cNvPicPr>
-            <a:picLocks noChangeAspect="1"/>
-          </p:cNvPicPr>
-          <p:nvPr/>
-        </p:nvPicPr>
-        <p:blipFill rotWithShape="1">
-          <a:blip r:embed="rId3"/>
-          <a:srcRect t="13713" r="1940" b="5452"/>
-          <a:stretch/>
-        </p:blipFill>
-        <p:spPr>
-          <a:xfrm>
-            <a:off x="10051953" y="3352457"/>
-            <a:ext cx="1028343" cy="647398"/>
-          </a:xfrm>
-          <a:prstGeom prst="rect">
-            <a:avLst/>
-          </a:prstGeom>
-        </p:spPr>
-      </p:pic>
-      <p:pic>
-        <p:nvPicPr>
-          <p:cNvPr id="8" name="Imagem 7">
-            <a:extLst>
-              <a:ext uri="{FF2B5EF4-FFF2-40B4-BE49-F238E27FC236}">
-                <a16:creationId xmlns:a16="http://schemas.microsoft.com/office/drawing/2014/main" id="{F6E070DC-D628-4C8A-8C5C-04674CC8DC05}"/>
-              </a:ext>
-            </a:extLst>
-          </p:cNvPr>
-          <p:cNvPicPr>
-            <a:picLocks noChangeAspect="1"/>
-          </p:cNvPicPr>
-          <p:nvPr/>
-        </p:nvPicPr>
-        <p:blipFill rotWithShape="1">
-          <a:blip r:embed="rId4"/>
-          <a:srcRect t="13515" r="2948" b="5650"/>
-          <a:stretch/>
-        </p:blipFill>
-        <p:spPr>
-          <a:xfrm>
-            <a:off x="9714857" y="2912942"/>
-            <a:ext cx="1096018" cy="721532"/>
-          </a:xfrm>
-          <a:prstGeom prst="rect">
-            <a:avLst/>
-          </a:prstGeom>
-        </p:spPr>
-      </p:pic>
-      <p:pic>
-        <p:nvPicPr>
-          <p:cNvPr id="9" name="Imagem 8">
-            <a:extLst>
-              <a:ext uri="{FF2B5EF4-FFF2-40B4-BE49-F238E27FC236}">
-                <a16:creationId xmlns:a16="http://schemas.microsoft.com/office/drawing/2014/main" id="{D6709A79-51CB-49C4-A5F0-0D4F7A2D27D5}"/>
-              </a:ext>
-            </a:extLst>
-          </p:cNvPr>
-          <p:cNvPicPr>
-            <a:picLocks noChangeAspect="1"/>
-          </p:cNvPicPr>
-          <p:nvPr/>
-        </p:nvPicPr>
-        <p:blipFill rotWithShape="1">
-          <a:blip r:embed="rId5" cstate="print">
-            <a:extLst>
-              <a:ext uri="{28A0092B-C50C-407E-A947-70E740481C1C}">
-                <a14:useLocalDpi xmlns:a14="http://schemas.microsoft.com/office/drawing/2010/main" val="0"/>
-              </a:ext>
-            </a:extLst>
-          </a:blip>
-          <a:srcRect b="7606"/>
-          <a:stretch/>
-        </p:blipFill>
-        <p:spPr>
-          <a:xfrm>
-            <a:off x="10636193" y="495318"/>
-            <a:ext cx="933346" cy="1013436"/>
-          </a:xfrm>
-          <a:prstGeom prst="rect">
-            <a:avLst/>
-          </a:prstGeom>
-        </p:spPr>
-      </p:pic>
-      <p:sp>
-        <p:nvSpPr>
-          <p:cNvPr id="10" name="Retângulo de cantos arredondados 47">
-            <a:extLst>
-              <a:ext uri="{FF2B5EF4-FFF2-40B4-BE49-F238E27FC236}">
-                <a16:creationId xmlns:a16="http://schemas.microsoft.com/office/drawing/2014/main" id="{83C696EB-1C5C-490F-9122-83860391BDF7}"/>
-              </a:ext>
-            </a:extLst>
-          </p:cNvPr>
-          <p:cNvSpPr/>
-          <p:nvPr/>
-        </p:nvSpPr>
-        <p:spPr>
-          <a:xfrm>
-            <a:off x="8923159" y="81706"/>
-            <a:ext cx="3169099" cy="4263209"/>
-          </a:xfrm>
-          <a:prstGeom prst="roundRect">
-            <a:avLst/>
-          </a:prstGeom>
-          <a:noFill/>
-          <a:ln w="28575">
-            <a:solidFill>
-              <a:schemeClr val="bg1">
-                <a:lumMod val="65000"/>
-              </a:schemeClr>
-            </a:solidFill>
-            <a:prstDash val="sysDash"/>
-          </a:ln>
-        </p:spPr>
-        <p:style>
-          <a:lnRef idx="2">
-            <a:schemeClr val="accent1">
-              <a:shade val="50000"/>
-            </a:schemeClr>
-          </a:lnRef>
-          <a:fillRef idx="1">
-            <a:schemeClr val="accent1"/>
-          </a:fillRef>
-          <a:effectRef idx="0">
-            <a:schemeClr val="accent1"/>
-          </a:effectRef>
-          <a:fontRef idx="minor">
-            <a:schemeClr val="lt1"/>
-          </a:fontRef>
-        </p:style>
-        <p:txBody>
-          <a:bodyPr rtlCol="0" anchor="t" anchorCtr="1"/>
-          <a:lstStyle/>
-          <a:p>
-            <a:pPr algn="ctr"/>
-            <a:endParaRPr lang="pt-BR" sz="1400" b="1" dirty="0">
-              <a:solidFill>
-                <a:schemeClr val="accent5">
-                  <a:lumMod val="75000"/>
-                </a:schemeClr>
-              </a:solidFill>
-            </a:endParaRPr>
-          </a:p>
-        </p:txBody>
-      </p:sp>
-      <p:sp>
-        <p:nvSpPr>
-          <p:cNvPr id="11" name="Retângulo de cantos arredondados 34">
-            <a:extLst>
-              <a:ext uri="{FF2B5EF4-FFF2-40B4-BE49-F238E27FC236}">
-                <a16:creationId xmlns:a16="http://schemas.microsoft.com/office/drawing/2014/main" id="{ADAADE1E-8853-4736-8CF2-4A202A4C662B}"/>
-              </a:ext>
-            </a:extLst>
-          </p:cNvPr>
-          <p:cNvSpPr/>
-          <p:nvPr/>
-        </p:nvSpPr>
-        <p:spPr>
-          <a:xfrm>
-            <a:off x="8757945" y="5020070"/>
-            <a:ext cx="3126488" cy="1719999"/>
-          </a:xfrm>
-          <a:prstGeom prst="roundRect">
-            <a:avLst/>
-          </a:prstGeom>
-          <a:noFill/>
-          <a:ln w="28575">
-            <a:solidFill>
-              <a:schemeClr val="bg1">
-                <a:lumMod val="65000"/>
-              </a:schemeClr>
-            </a:solidFill>
-            <a:prstDash val="sysDash"/>
-          </a:ln>
-        </p:spPr>
-        <p:style>
-          <a:lnRef idx="2">
-            <a:schemeClr val="accent1">
-              <a:shade val="50000"/>
-            </a:schemeClr>
-          </a:lnRef>
-          <a:fillRef idx="1">
-            <a:schemeClr val="accent1"/>
-          </a:fillRef>
-          <a:effectRef idx="0">
-            <a:schemeClr val="accent1"/>
-          </a:effectRef>
-          <a:fontRef idx="minor">
-            <a:schemeClr val="lt1"/>
-          </a:fontRef>
-        </p:style>
-        <p:txBody>
-          <a:bodyPr rtlCol="0" anchor="t" anchorCtr="1"/>
-          <a:lstStyle/>
-          <a:p>
-            <a:pPr algn="ctr"/>
-            <a:endParaRPr lang="pt-BR" b="1" dirty="0">
-              <a:solidFill>
-                <a:schemeClr val="accent5">
-                  <a:lumMod val="75000"/>
-                </a:schemeClr>
-              </a:solidFill>
-            </a:endParaRPr>
-          </a:p>
-        </p:txBody>
-      </p:sp>
-      <p:sp>
-        <p:nvSpPr>
-          <p:cNvPr id="12" name="Retângulo de cantos arredondados 4">
-            <a:extLst>
-              <a:ext uri="{FF2B5EF4-FFF2-40B4-BE49-F238E27FC236}">
-                <a16:creationId xmlns:a16="http://schemas.microsoft.com/office/drawing/2014/main" id="{2227A1A2-E5D8-4A99-BB5A-E6BE57F2E300}"/>
-              </a:ext>
-            </a:extLst>
-          </p:cNvPr>
-          <p:cNvSpPr/>
-          <p:nvPr/>
-        </p:nvSpPr>
-        <p:spPr>
-          <a:xfrm>
-            <a:off x="76204" y="913339"/>
-            <a:ext cx="3169099" cy="3904160"/>
-          </a:xfrm>
-          <a:prstGeom prst="roundRect">
-            <a:avLst/>
-          </a:prstGeom>
-          <a:noFill/>
-          <a:ln w="28575">
-            <a:solidFill>
-              <a:schemeClr val="bg1">
-                <a:lumMod val="65000"/>
-              </a:schemeClr>
-            </a:solidFill>
-            <a:prstDash val="sysDash"/>
-          </a:ln>
-        </p:spPr>
-        <p:style>
-          <a:lnRef idx="2">
-            <a:schemeClr val="accent1">
-              <a:shade val="50000"/>
-            </a:schemeClr>
-          </a:lnRef>
-          <a:fillRef idx="1">
-            <a:schemeClr val="accent1"/>
-          </a:fillRef>
-          <a:effectRef idx="0">
-            <a:schemeClr val="accent1"/>
-          </a:effectRef>
-          <a:fontRef idx="minor">
-            <a:schemeClr val="lt1"/>
-          </a:fontRef>
-        </p:style>
-        <p:txBody>
-          <a:bodyPr rtlCol="0" anchor="t" anchorCtr="1"/>
-          <a:lstStyle/>
-          <a:p>
-            <a:pPr algn="ctr"/>
-            <a:endParaRPr lang="pt-BR" sz="1400" b="1" dirty="0">
-              <a:solidFill>
-                <a:schemeClr val="accent5">
-                  <a:lumMod val="75000"/>
-                </a:schemeClr>
-              </a:solidFill>
-            </a:endParaRPr>
-          </a:p>
-        </p:txBody>
-      </p:sp>
-      <p:sp>
-        <p:nvSpPr>
-          <p:cNvPr id="13" name="Retângulo de cantos arredondados 43">
-            <a:extLst>
-              <a:ext uri="{FF2B5EF4-FFF2-40B4-BE49-F238E27FC236}">
-                <a16:creationId xmlns:a16="http://schemas.microsoft.com/office/drawing/2014/main" id="{4EB7480B-97D3-4A49-8B73-C6D45E7D6C32}"/>
-              </a:ext>
-            </a:extLst>
-          </p:cNvPr>
-          <p:cNvSpPr/>
-          <p:nvPr/>
-        </p:nvSpPr>
-        <p:spPr>
-          <a:xfrm>
-            <a:off x="957726" y="5151157"/>
-            <a:ext cx="3126488" cy="1643636"/>
-          </a:xfrm>
-          <a:prstGeom prst="roundRect">
-            <a:avLst/>
-          </a:prstGeom>
-          <a:noFill/>
-          <a:ln w="28575">
-            <a:solidFill>
-              <a:schemeClr val="bg1">
-                <a:lumMod val="65000"/>
-              </a:schemeClr>
-            </a:solidFill>
-            <a:prstDash val="sysDash"/>
-          </a:ln>
-        </p:spPr>
-        <p:style>
-          <a:lnRef idx="2">
-            <a:schemeClr val="accent1">
-              <a:shade val="50000"/>
-            </a:schemeClr>
-          </a:lnRef>
-          <a:fillRef idx="1">
-            <a:schemeClr val="accent1"/>
-          </a:fillRef>
-          <a:effectRef idx="0">
-            <a:schemeClr val="accent1"/>
-          </a:effectRef>
-          <a:fontRef idx="minor">
-            <a:schemeClr val="lt1"/>
-          </a:fontRef>
-        </p:style>
-        <p:txBody>
-          <a:bodyPr rtlCol="0" anchor="t" anchorCtr="1"/>
-          <a:lstStyle/>
-          <a:p>
-            <a:pPr algn="ctr"/>
-            <a:endParaRPr lang="pt-BR" b="1" dirty="0">
-              <a:solidFill>
-                <a:schemeClr val="accent5">
-                  <a:lumMod val="75000"/>
-                </a:schemeClr>
-              </a:solidFill>
-            </a:endParaRPr>
-          </a:p>
-        </p:txBody>
-      </p:sp>
-      <p:pic>
-        <p:nvPicPr>
-          <p:cNvPr id="14" name="Imagem 13">
-            <a:extLst>
-              <a:ext uri="{FF2B5EF4-FFF2-40B4-BE49-F238E27FC236}">
-                <a16:creationId xmlns:a16="http://schemas.microsoft.com/office/drawing/2014/main" id="{1B6A85D1-387A-42F2-A3BF-FD03B3A00165}"/>
-              </a:ext>
-            </a:extLst>
-          </p:cNvPr>
-          <p:cNvPicPr>
-            <a:picLocks noChangeAspect="1"/>
-          </p:cNvPicPr>
-          <p:nvPr/>
-        </p:nvPicPr>
-        <p:blipFill>
-          <a:blip r:embed="rId6" cstate="print">
-            <a:extLst>
-              <a:ext uri="{28A0092B-C50C-407E-A947-70E740481C1C}">
-                <a14:useLocalDpi xmlns:a14="http://schemas.microsoft.com/office/drawing/2010/main" val="0"/>
-              </a:ext>
-            </a:extLst>
-          </a:blip>
-          <a:stretch>
-            <a:fillRect/>
-          </a:stretch>
-        </p:blipFill>
-        <p:spPr>
-          <a:xfrm>
-            <a:off x="230042" y="1099748"/>
-            <a:ext cx="1245247" cy="1245247"/>
-          </a:xfrm>
-          <a:prstGeom prst="rect">
-            <a:avLst/>
-          </a:prstGeom>
-        </p:spPr>
-      </p:pic>
-      <p:pic>
-        <p:nvPicPr>
-          <p:cNvPr id="15" name="Imagem 14">
-            <a:extLst>
-              <a:ext uri="{FF2B5EF4-FFF2-40B4-BE49-F238E27FC236}">
-                <a16:creationId xmlns:a16="http://schemas.microsoft.com/office/drawing/2014/main" id="{8C45B846-FDC4-45E5-B579-D0A7C57FB70F}"/>
-              </a:ext>
-            </a:extLst>
-          </p:cNvPr>
-          <p:cNvPicPr>
-            <a:picLocks noChangeAspect="1"/>
-          </p:cNvPicPr>
-          <p:nvPr/>
-        </p:nvPicPr>
-        <p:blipFill>
-          <a:blip r:embed="rId7" cstate="print">
-            <a:extLst>
-              <a:ext uri="{28A0092B-C50C-407E-A947-70E740481C1C}">
-                <a14:useLocalDpi xmlns:a14="http://schemas.microsoft.com/office/drawing/2010/main" val="0"/>
-              </a:ext>
-            </a:extLst>
-          </a:blip>
-          <a:stretch>
-            <a:fillRect/>
-          </a:stretch>
-        </p:blipFill>
-        <p:spPr>
-          <a:xfrm>
-            <a:off x="315052" y="2709147"/>
-            <a:ext cx="885670" cy="885670"/>
-          </a:xfrm>
-          <a:prstGeom prst="rect">
-            <a:avLst/>
-          </a:prstGeom>
-        </p:spPr>
-      </p:pic>
-      <p:pic>
-        <p:nvPicPr>
-          <p:cNvPr id="16" name="Imagem 15">
-            <a:extLst>
-              <a:ext uri="{FF2B5EF4-FFF2-40B4-BE49-F238E27FC236}">
-                <a16:creationId xmlns:a16="http://schemas.microsoft.com/office/drawing/2014/main" id="{8E436BE7-17C7-4B83-ABBD-C913090BCBF2}"/>
-              </a:ext>
-            </a:extLst>
-          </p:cNvPr>
-          <p:cNvPicPr>
-            <a:picLocks noChangeAspect="1"/>
-          </p:cNvPicPr>
-          <p:nvPr/>
-        </p:nvPicPr>
-        <p:blipFill>
-          <a:blip r:embed="rId8" cstate="print">
-            <a:extLst>
-              <a:ext uri="{28A0092B-C50C-407E-A947-70E740481C1C}">
-                <a14:useLocalDpi xmlns:a14="http://schemas.microsoft.com/office/drawing/2010/main" val="0"/>
-              </a:ext>
-            </a:extLst>
-          </a:blip>
-          <a:stretch>
-            <a:fillRect/>
-          </a:stretch>
-        </p:blipFill>
-        <p:spPr>
-          <a:xfrm>
-            <a:off x="1130431" y="5536196"/>
-            <a:ext cx="1061699" cy="1061699"/>
-          </a:xfrm>
-          <a:prstGeom prst="rect">
-            <a:avLst/>
-          </a:prstGeom>
-        </p:spPr>
-      </p:pic>
-      <p:sp>
-        <p:nvSpPr>
-          <p:cNvPr id="17" name="CaixaDeTexto 16">
-            <a:extLst>
-              <a:ext uri="{FF2B5EF4-FFF2-40B4-BE49-F238E27FC236}">
-                <a16:creationId xmlns:a16="http://schemas.microsoft.com/office/drawing/2014/main" id="{B0CC218E-71A1-405F-BE48-5F25DC0A5924}"/>
-              </a:ext>
-            </a:extLst>
-          </p:cNvPr>
-          <p:cNvSpPr txBox="1"/>
-          <p:nvPr/>
-        </p:nvSpPr>
-        <p:spPr>
-          <a:xfrm>
-            <a:off x="1445545" y="1315617"/>
-            <a:ext cx="1848070" cy="1384995"/>
-          </a:xfrm>
-          <a:prstGeom prst="rect">
-            <a:avLst/>
-          </a:prstGeom>
-          <a:noFill/>
-        </p:spPr>
-        <p:txBody>
-          <a:bodyPr wrap="none" rtlCol="0">
-            <a:spAutoFit/>
-          </a:bodyPr>
-          <a:lstStyle/>
-          <a:p>
-            <a:r>
-              <a:rPr lang="pt-BR" sz="1200" b="1" dirty="0">
-                <a:solidFill>
-                  <a:schemeClr val="accent5">
-                    <a:lumMod val="75000"/>
-                  </a:schemeClr>
-                </a:solidFill>
-              </a:rPr>
-              <a:t>Sensor DHT11</a:t>
-            </a:r>
-          </a:p>
-          <a:p>
-            <a:r>
-              <a:rPr lang="pt-BR" sz="1200" dirty="0"/>
-              <a:t>Ligado na </a:t>
-            </a:r>
-            <a:r>
-              <a:rPr lang="pt-BR" sz="1200" dirty="0" err="1"/>
-              <a:t>Protoboard</a:t>
-            </a:r>
-            <a:endParaRPr lang="pt-BR" sz="1200" dirty="0"/>
-          </a:p>
-          <a:p>
-            <a:r>
-              <a:rPr lang="pt-BR" sz="1200" dirty="0"/>
-              <a:t>Fios: VCC, Data e GND</a:t>
-            </a:r>
-          </a:p>
-          <a:p>
-            <a:r>
-              <a:rPr lang="pt-BR" sz="1200" dirty="0" err="1"/>
-              <a:t>Arduino</a:t>
-            </a:r>
-            <a:r>
-              <a:rPr lang="pt-BR" sz="1200" dirty="0"/>
-              <a:t> Uno</a:t>
-            </a:r>
-          </a:p>
-          <a:p>
-            <a:r>
-              <a:rPr lang="pt-BR" sz="1200" dirty="0"/>
-              <a:t>Conexão com o host: USB</a:t>
-            </a:r>
-          </a:p>
-          <a:p>
-            <a:r>
-              <a:rPr lang="pt-BR" sz="1200"/>
-              <a:t>Porta transmissão</a:t>
-            </a:r>
-            <a:r>
-              <a:rPr lang="pt-BR" sz="1200" dirty="0"/>
-              <a:t>: A1</a:t>
-            </a:r>
-          </a:p>
-          <a:p>
-            <a:r>
-              <a:rPr lang="pt-BR" sz="1200" dirty="0"/>
-              <a:t>Porta comunicação: COM5</a:t>
-            </a:r>
-          </a:p>
-        </p:txBody>
-      </p:sp>
-      <p:sp>
-        <p:nvSpPr>
-          <p:cNvPr id="18" name="CaixaDeTexto 17">
-            <a:extLst>
-              <a:ext uri="{FF2B5EF4-FFF2-40B4-BE49-F238E27FC236}">
-                <a16:creationId xmlns:a16="http://schemas.microsoft.com/office/drawing/2014/main" id="{520DE46F-02FE-41E9-A84A-3F5F6C378672}"/>
-              </a:ext>
-            </a:extLst>
-          </p:cNvPr>
-          <p:cNvSpPr txBox="1"/>
-          <p:nvPr/>
-        </p:nvSpPr>
-        <p:spPr>
-          <a:xfrm>
-            <a:off x="1290053" y="2671048"/>
-            <a:ext cx="1956113" cy="1384995"/>
-          </a:xfrm>
-          <a:prstGeom prst="rect">
-            <a:avLst/>
-          </a:prstGeom>
-          <a:noFill/>
-        </p:spPr>
-        <p:txBody>
-          <a:bodyPr wrap="none" rtlCol="0">
-            <a:spAutoFit/>
-          </a:bodyPr>
-          <a:lstStyle/>
-          <a:p>
-            <a:r>
-              <a:rPr lang="pt-BR" sz="1200" b="1" dirty="0">
-                <a:solidFill>
-                  <a:schemeClr val="accent5">
-                    <a:lumMod val="75000"/>
-                  </a:schemeClr>
-                </a:solidFill>
-              </a:rPr>
-              <a:t>Host (servidor local)</a:t>
-            </a:r>
-          </a:p>
-          <a:p>
-            <a:r>
-              <a:rPr lang="pt-BR" sz="1200" dirty="0"/>
-              <a:t>Windows 10 </a:t>
-            </a:r>
-            <a:r>
-              <a:rPr lang="pt-BR" sz="1200" dirty="0" err="1"/>
-              <a:t>version</a:t>
-            </a:r>
-            <a:r>
-              <a:rPr lang="pt-BR" sz="1200" dirty="0"/>
-              <a:t> 1803</a:t>
-            </a:r>
-          </a:p>
-          <a:p>
-            <a:r>
-              <a:rPr lang="pt-BR" sz="1200" dirty="0"/>
-              <a:t>IDE </a:t>
-            </a:r>
-            <a:r>
-              <a:rPr lang="pt-BR" sz="1200" dirty="0" err="1"/>
-              <a:t>Arduino</a:t>
-            </a:r>
-            <a:r>
-              <a:rPr lang="pt-BR" sz="1200" dirty="0"/>
-              <a:t>  </a:t>
-            </a:r>
-            <a:r>
-              <a:rPr lang="pt-BR" sz="1200" dirty="0" err="1"/>
-              <a:t>version</a:t>
-            </a:r>
-            <a:r>
-              <a:rPr lang="pt-BR" sz="1200" dirty="0"/>
-              <a:t> 1.8.9.0</a:t>
-            </a:r>
-          </a:p>
-          <a:p>
-            <a:r>
-              <a:rPr lang="pt-BR" sz="1200" dirty="0"/>
-              <a:t>Node.js</a:t>
-            </a:r>
-          </a:p>
-          <a:p>
-            <a:r>
-              <a:rPr lang="pt-BR" sz="1200" dirty="0"/>
-              <a:t>IP dinâmico</a:t>
-            </a:r>
-          </a:p>
-          <a:p>
-            <a:r>
-              <a:rPr lang="pt-BR" sz="1200" dirty="0"/>
-              <a:t>Porta comunicação internet:</a:t>
-            </a:r>
-          </a:p>
-          <a:p>
-            <a:r>
-              <a:rPr lang="pt-BR" sz="1200" dirty="0"/>
-              <a:t>8080</a:t>
-            </a:r>
-          </a:p>
-        </p:txBody>
-      </p:sp>
-      <p:sp>
-        <p:nvSpPr>
-          <p:cNvPr id="19" name="CaixaDeTexto 18">
-            <a:extLst>
-              <a:ext uri="{FF2B5EF4-FFF2-40B4-BE49-F238E27FC236}">
-                <a16:creationId xmlns:a16="http://schemas.microsoft.com/office/drawing/2014/main" id="{8A2C362A-E350-474D-A2BA-2EF1C96AACAC}"/>
-              </a:ext>
-            </a:extLst>
-          </p:cNvPr>
-          <p:cNvSpPr txBox="1"/>
-          <p:nvPr/>
-        </p:nvSpPr>
-        <p:spPr>
-          <a:xfrm>
-            <a:off x="1455029" y="4163781"/>
-            <a:ext cx="1329659" cy="461665"/>
-          </a:xfrm>
-          <a:prstGeom prst="rect">
-            <a:avLst/>
-          </a:prstGeom>
-          <a:noFill/>
-        </p:spPr>
-        <p:txBody>
-          <a:bodyPr wrap="none" rtlCol="0">
-            <a:spAutoFit/>
-          </a:bodyPr>
-          <a:lstStyle/>
-          <a:p>
-            <a:r>
-              <a:rPr lang="pt-BR" sz="1200" b="1" dirty="0">
-                <a:solidFill>
-                  <a:schemeClr val="accent5">
-                    <a:lumMod val="75000"/>
-                  </a:schemeClr>
-                </a:solidFill>
-              </a:rPr>
-              <a:t>Conexão Internet:</a:t>
-            </a:r>
-          </a:p>
-          <a:p>
-            <a:r>
-              <a:rPr lang="pt-BR" sz="1200" dirty="0"/>
-              <a:t>Roteador </a:t>
-            </a:r>
-            <a:r>
-              <a:rPr lang="pt-BR" sz="1200" dirty="0" err="1"/>
-              <a:t>Wi-fi</a:t>
-            </a:r>
-            <a:endParaRPr lang="pt-BR" sz="1200" dirty="0"/>
-          </a:p>
-        </p:txBody>
-      </p:sp>
-      <p:sp>
-        <p:nvSpPr>
-          <p:cNvPr id="20" name="CaixaDeTexto 19">
-            <a:extLst>
-              <a:ext uri="{FF2B5EF4-FFF2-40B4-BE49-F238E27FC236}">
-                <a16:creationId xmlns:a16="http://schemas.microsoft.com/office/drawing/2014/main" id="{87D50B38-4DF4-4928-BE1A-970E80A4ACFD}"/>
-              </a:ext>
-            </a:extLst>
-          </p:cNvPr>
-          <p:cNvSpPr txBox="1"/>
-          <p:nvPr/>
-        </p:nvSpPr>
-        <p:spPr>
-          <a:xfrm>
-            <a:off x="6544807" y="2114611"/>
-            <a:ext cx="2137185" cy="1015663"/>
-          </a:xfrm>
-          <a:prstGeom prst="rect">
-            <a:avLst/>
-          </a:prstGeom>
-          <a:noFill/>
-        </p:spPr>
-        <p:txBody>
-          <a:bodyPr wrap="square" rtlCol="0">
-            <a:spAutoFit/>
-          </a:bodyPr>
-          <a:lstStyle/>
-          <a:p>
-            <a:r>
-              <a:rPr lang="pt-BR" sz="1200" b="1" dirty="0">
-                <a:solidFill>
-                  <a:schemeClr val="accent5">
-                    <a:lumMod val="75000"/>
-                  </a:schemeClr>
-                </a:solidFill>
-              </a:rPr>
-              <a:t>Site Cimentool (solução)</a:t>
-            </a:r>
-          </a:p>
-          <a:p>
-            <a:r>
-              <a:rPr lang="pt-BR" sz="1200" dirty="0"/>
-              <a:t>Linguagens de </a:t>
-            </a:r>
-            <a:r>
-              <a:rPr lang="pt-BR" sz="1200" dirty="0" err="1"/>
-              <a:t>prog</a:t>
-            </a:r>
-            <a:r>
-              <a:rPr lang="pt-BR" sz="1200" dirty="0"/>
-              <a:t>: HTML, CSS, </a:t>
-            </a:r>
-            <a:r>
-              <a:rPr lang="pt-BR" sz="1200" dirty="0" err="1"/>
-              <a:t>JavaScript</a:t>
-            </a:r>
-            <a:r>
-              <a:rPr lang="pt-BR" sz="1200" dirty="0"/>
-              <a:t> e Node.js</a:t>
-            </a:r>
-          </a:p>
-          <a:p>
-            <a:r>
-              <a:rPr lang="pt-BR" sz="1200" dirty="0" err="1"/>
-              <a:t>Templates</a:t>
-            </a:r>
-            <a:r>
-              <a:rPr lang="pt-BR" sz="1200" dirty="0"/>
-              <a:t>: </a:t>
-            </a:r>
-            <a:r>
-              <a:rPr lang="pt-BR" sz="1200" dirty="0" err="1"/>
-              <a:t>Bootstrap</a:t>
-            </a:r>
-            <a:r>
-              <a:rPr lang="pt-BR" sz="1200" dirty="0"/>
-              <a:t>, Materialize e Charts.js</a:t>
-            </a:r>
-          </a:p>
-        </p:txBody>
-      </p:sp>
-      <p:sp>
-        <p:nvSpPr>
-          <p:cNvPr id="21" name="CaixaDeTexto 20">
-            <a:extLst>
-              <a:ext uri="{FF2B5EF4-FFF2-40B4-BE49-F238E27FC236}">
-                <a16:creationId xmlns:a16="http://schemas.microsoft.com/office/drawing/2014/main" id="{63FA833D-2E1B-4A37-85E2-30962790A2C6}"/>
-              </a:ext>
-            </a:extLst>
-          </p:cNvPr>
-          <p:cNvSpPr txBox="1"/>
-          <p:nvPr/>
-        </p:nvSpPr>
-        <p:spPr>
-          <a:xfrm>
-            <a:off x="6600404" y="3217736"/>
-            <a:ext cx="1766838" cy="461665"/>
-          </a:xfrm>
-          <a:prstGeom prst="rect">
-            <a:avLst/>
-          </a:prstGeom>
-          <a:noFill/>
-        </p:spPr>
-        <p:txBody>
-          <a:bodyPr wrap="square" rtlCol="0">
-            <a:spAutoFit/>
-          </a:bodyPr>
-          <a:lstStyle/>
-          <a:p>
-            <a:r>
-              <a:rPr lang="pt-BR" sz="1200" b="1" dirty="0">
-                <a:solidFill>
-                  <a:schemeClr val="accent5">
-                    <a:lumMod val="75000"/>
-                  </a:schemeClr>
-                </a:solidFill>
-              </a:rPr>
-              <a:t>Banco de Dados</a:t>
-            </a:r>
-          </a:p>
-          <a:p>
-            <a:r>
-              <a:rPr lang="pt-BR" sz="1200" dirty="0"/>
-              <a:t>SQL Server</a:t>
-            </a:r>
-          </a:p>
-        </p:txBody>
-      </p:sp>
-      <p:cxnSp>
-        <p:nvCxnSpPr>
-          <p:cNvPr id="22" name="Conector em curva 5">
-            <a:extLst>
-              <a:ext uri="{FF2B5EF4-FFF2-40B4-BE49-F238E27FC236}">
-                <a16:creationId xmlns:a16="http://schemas.microsoft.com/office/drawing/2014/main" id="{D338AF39-6B84-41CE-AFEE-97FD69E78F0F}"/>
-              </a:ext>
-            </a:extLst>
-          </p:cNvPr>
-          <p:cNvCxnSpPr/>
-          <p:nvPr/>
-        </p:nvCxnSpPr>
-        <p:spPr>
-          <a:xfrm rot="16200000" flipH="1">
-            <a:off x="292347" y="2125109"/>
-            <a:ext cx="827046" cy="486281"/>
-          </a:xfrm>
-          <a:prstGeom prst="curvedConnector3">
-            <a:avLst>
-              <a:gd name="adj1" fmla="val 50000"/>
-            </a:avLst>
-          </a:prstGeom>
-          <a:ln w="38100">
-            <a:solidFill>
-              <a:schemeClr val="accent5">
-                <a:lumMod val="75000"/>
-              </a:schemeClr>
-            </a:solidFill>
-            <a:headEnd type="triangle"/>
-            <a:tailEnd type="triangle"/>
-          </a:ln>
-        </p:spPr>
-        <p:style>
-          <a:lnRef idx="1">
-            <a:schemeClr val="accent1"/>
-          </a:lnRef>
-          <a:fillRef idx="0">
-            <a:schemeClr val="accent1"/>
-          </a:fillRef>
-          <a:effectRef idx="0">
-            <a:schemeClr val="accent1"/>
-          </a:effectRef>
-          <a:fontRef idx="minor">
-            <a:schemeClr val="tx1"/>
-          </a:fontRef>
-        </p:style>
-      </p:cxnSp>
-      <p:cxnSp>
-        <p:nvCxnSpPr>
-          <p:cNvPr id="23" name="Conector em curva 12">
-            <a:extLst>
-              <a:ext uri="{FF2B5EF4-FFF2-40B4-BE49-F238E27FC236}">
-                <a16:creationId xmlns:a16="http://schemas.microsoft.com/office/drawing/2014/main" id="{A91BC12D-8495-4906-8FC4-8E0777859F15}"/>
-              </a:ext>
-            </a:extLst>
-          </p:cNvPr>
-          <p:cNvCxnSpPr>
-            <a:stCxn id="15" idx="2"/>
-            <a:endCxn id="48" idx="0"/>
-          </p:cNvCxnSpPr>
-          <p:nvPr/>
-        </p:nvCxnSpPr>
-        <p:spPr>
-          <a:xfrm rot="16200000" flipH="1">
-            <a:off x="544792" y="3807911"/>
-            <a:ext cx="613399" cy="187209"/>
-          </a:xfrm>
-          <a:prstGeom prst="curvedConnector3">
-            <a:avLst/>
-          </a:prstGeom>
-          <a:ln w="38100">
-            <a:solidFill>
-              <a:schemeClr val="accent5">
-                <a:lumMod val="75000"/>
-              </a:schemeClr>
-            </a:solidFill>
-            <a:headEnd type="triangle"/>
-            <a:tailEnd type="triangle"/>
-          </a:ln>
-        </p:spPr>
-        <p:style>
-          <a:lnRef idx="1">
-            <a:schemeClr val="accent1"/>
-          </a:lnRef>
-          <a:fillRef idx="0">
-            <a:schemeClr val="accent1"/>
-          </a:fillRef>
-          <a:effectRef idx="0">
-            <a:schemeClr val="accent1"/>
-          </a:effectRef>
-          <a:fontRef idx="minor">
-            <a:schemeClr val="tx1"/>
-          </a:fontRef>
-        </p:style>
-      </p:cxnSp>
-      <p:cxnSp>
-        <p:nvCxnSpPr>
-          <p:cNvPr id="24" name="Conector em curva 25">
-            <a:extLst>
-              <a:ext uri="{FF2B5EF4-FFF2-40B4-BE49-F238E27FC236}">
-                <a16:creationId xmlns:a16="http://schemas.microsoft.com/office/drawing/2014/main" id="{99B7C6D4-2977-4ECE-B3A7-4FC9A9E4D22C}"/>
-              </a:ext>
-            </a:extLst>
-          </p:cNvPr>
-          <p:cNvCxnSpPr>
-            <a:stCxn id="16" idx="3"/>
-          </p:cNvCxnSpPr>
-          <p:nvPr/>
-        </p:nvCxnSpPr>
-        <p:spPr>
-          <a:xfrm>
-            <a:off x="2192130" y="6067046"/>
-            <a:ext cx="430753" cy="277839"/>
-          </a:xfrm>
-          <a:prstGeom prst="curvedConnector3">
-            <a:avLst/>
-          </a:prstGeom>
-          <a:ln w="38100">
-            <a:solidFill>
-              <a:schemeClr val="accent5">
-                <a:lumMod val="75000"/>
-              </a:schemeClr>
-            </a:solidFill>
-            <a:headEnd type="triangle"/>
-            <a:tailEnd type="triangle"/>
-          </a:ln>
-        </p:spPr>
-        <p:style>
-          <a:lnRef idx="1">
-            <a:schemeClr val="accent1"/>
-          </a:lnRef>
-          <a:fillRef idx="0">
-            <a:schemeClr val="accent1"/>
-          </a:fillRef>
-          <a:effectRef idx="0">
-            <a:schemeClr val="accent1"/>
-          </a:effectRef>
-          <a:fontRef idx="minor">
-            <a:schemeClr val="tx1"/>
-          </a:fontRef>
-        </p:style>
-      </p:cxnSp>
-      <p:cxnSp>
-        <p:nvCxnSpPr>
-          <p:cNvPr id="25" name="Conector em curva 27">
-            <a:extLst>
-              <a:ext uri="{FF2B5EF4-FFF2-40B4-BE49-F238E27FC236}">
-                <a16:creationId xmlns:a16="http://schemas.microsoft.com/office/drawing/2014/main" id="{1603DFFD-AEA4-43EB-805D-ACEE852034DD}"/>
-              </a:ext>
-            </a:extLst>
-          </p:cNvPr>
-          <p:cNvCxnSpPr>
-            <a:endCxn id="6" idx="1"/>
-          </p:cNvCxnSpPr>
-          <p:nvPr/>
-        </p:nvCxnSpPr>
-        <p:spPr>
-          <a:xfrm flipV="1">
-            <a:off x="3888061" y="4702485"/>
-            <a:ext cx="693082" cy="1654761"/>
-          </a:xfrm>
-          <a:prstGeom prst="curvedConnector3">
-            <a:avLst>
-              <a:gd name="adj1" fmla="val 50000"/>
-            </a:avLst>
-          </a:prstGeom>
-          <a:ln w="38100">
-            <a:solidFill>
-              <a:schemeClr val="accent5">
-                <a:lumMod val="75000"/>
-              </a:schemeClr>
-            </a:solidFill>
-            <a:headEnd type="triangle"/>
-            <a:tailEnd type="triangle"/>
-          </a:ln>
-        </p:spPr>
-        <p:style>
-          <a:lnRef idx="1">
-            <a:schemeClr val="accent1"/>
-          </a:lnRef>
-          <a:fillRef idx="0">
-            <a:schemeClr val="accent1"/>
-          </a:fillRef>
-          <a:effectRef idx="0">
-            <a:schemeClr val="accent1"/>
-          </a:effectRef>
-          <a:fontRef idx="minor">
-            <a:schemeClr val="tx1"/>
-          </a:fontRef>
-        </p:style>
-      </p:cxnSp>
-      <p:pic>
-        <p:nvPicPr>
-          <p:cNvPr id="26" name="Imagem 25">
-            <a:extLst>
-              <a:ext uri="{FF2B5EF4-FFF2-40B4-BE49-F238E27FC236}">
-                <a16:creationId xmlns:a16="http://schemas.microsoft.com/office/drawing/2014/main" id="{33BFDD0F-A76F-48F0-964D-E245D2F85B7C}"/>
-              </a:ext>
-            </a:extLst>
-          </p:cNvPr>
-          <p:cNvPicPr>
-            <a:picLocks noChangeAspect="1"/>
-          </p:cNvPicPr>
-          <p:nvPr/>
-        </p:nvPicPr>
-        <p:blipFill>
-          <a:blip r:embed="rId8" cstate="print">
-            <a:extLst>
-              <a:ext uri="{28A0092B-C50C-407E-A947-70E740481C1C}">
-                <a14:useLocalDpi xmlns:a14="http://schemas.microsoft.com/office/drawing/2010/main" val="0"/>
-              </a:ext>
-            </a:extLst>
-          </a:blip>
-          <a:stretch>
-            <a:fillRect/>
-          </a:stretch>
-        </p:blipFill>
-        <p:spPr>
-          <a:xfrm flipH="1">
-            <a:off x="10673661" y="5524831"/>
-            <a:ext cx="1122767" cy="1061699"/>
-          </a:xfrm>
-          <a:prstGeom prst="rect">
-            <a:avLst/>
-          </a:prstGeom>
-        </p:spPr>
-      </p:pic>
-      <p:cxnSp>
-        <p:nvCxnSpPr>
-          <p:cNvPr id="27" name="Conector em curva 54">
-            <a:extLst>
-              <a:ext uri="{FF2B5EF4-FFF2-40B4-BE49-F238E27FC236}">
-                <a16:creationId xmlns:a16="http://schemas.microsoft.com/office/drawing/2014/main" id="{22C38DCD-72A4-4665-8072-E40052A529F3}"/>
-              </a:ext>
-            </a:extLst>
-          </p:cNvPr>
-          <p:cNvCxnSpPr>
-            <a:cxnSpLocks/>
-            <a:stCxn id="6" idx="3"/>
-          </p:cNvCxnSpPr>
-          <p:nvPr/>
-        </p:nvCxnSpPr>
-        <p:spPr>
-          <a:xfrm>
-            <a:off x="8219327" y="4702485"/>
-            <a:ext cx="781022" cy="1466935"/>
-          </a:xfrm>
-          <a:prstGeom prst="curvedConnector3">
-            <a:avLst/>
-          </a:prstGeom>
-          <a:ln w="38100">
-            <a:solidFill>
-              <a:schemeClr val="accent5">
-                <a:lumMod val="75000"/>
-              </a:schemeClr>
-            </a:solidFill>
-            <a:headEnd type="triangle"/>
-            <a:tailEnd type="triangle"/>
-          </a:ln>
-        </p:spPr>
-        <p:style>
-          <a:lnRef idx="1">
-            <a:schemeClr val="accent1"/>
-          </a:lnRef>
-          <a:fillRef idx="0">
-            <a:schemeClr val="accent1"/>
-          </a:fillRef>
-          <a:effectRef idx="0">
-            <a:schemeClr val="accent1"/>
-          </a:effectRef>
-          <a:fontRef idx="minor">
-            <a:schemeClr val="tx1"/>
-          </a:fontRef>
-        </p:style>
-      </p:cxnSp>
-      <p:cxnSp>
-        <p:nvCxnSpPr>
-          <p:cNvPr id="28" name="Conector em curva 56">
-            <a:extLst>
-              <a:ext uri="{FF2B5EF4-FFF2-40B4-BE49-F238E27FC236}">
-                <a16:creationId xmlns:a16="http://schemas.microsoft.com/office/drawing/2014/main" id="{B54A9E8F-EEE4-42CF-A2BB-5FA00741B044}"/>
-              </a:ext>
-            </a:extLst>
-          </p:cNvPr>
-          <p:cNvCxnSpPr/>
-          <p:nvPr/>
-        </p:nvCxnSpPr>
-        <p:spPr>
-          <a:xfrm flipV="1">
-            <a:off x="10245311" y="5778913"/>
-            <a:ext cx="513226" cy="390508"/>
-          </a:xfrm>
-          <a:prstGeom prst="curvedConnector3">
-            <a:avLst/>
-          </a:prstGeom>
-          <a:ln w="38100">
-            <a:solidFill>
-              <a:schemeClr val="accent5">
-                <a:lumMod val="75000"/>
-              </a:schemeClr>
-            </a:solidFill>
-            <a:headEnd type="triangle"/>
-            <a:tailEnd type="triangle"/>
-          </a:ln>
-        </p:spPr>
-        <p:style>
-          <a:lnRef idx="1">
-            <a:schemeClr val="accent1"/>
-          </a:lnRef>
-          <a:fillRef idx="0">
-            <a:schemeClr val="accent1"/>
-          </a:fillRef>
-          <a:effectRef idx="0">
-            <a:schemeClr val="accent1"/>
-          </a:effectRef>
-          <a:fontRef idx="minor">
-            <a:schemeClr val="tx1"/>
-          </a:fontRef>
-        </p:style>
-      </p:cxnSp>
-      <p:sp>
-        <p:nvSpPr>
-          <p:cNvPr id="29" name="CaixaDeTexto 28">
-            <a:extLst>
-              <a:ext uri="{FF2B5EF4-FFF2-40B4-BE49-F238E27FC236}">
-                <a16:creationId xmlns:a16="http://schemas.microsoft.com/office/drawing/2014/main" id="{C387E0CB-6E8C-4D9B-95DD-A42E1101E2C2}"/>
-              </a:ext>
-            </a:extLst>
-          </p:cNvPr>
-          <p:cNvSpPr txBox="1"/>
-          <p:nvPr/>
-        </p:nvSpPr>
-        <p:spPr>
-          <a:xfrm>
-            <a:off x="9021143" y="1617118"/>
-            <a:ext cx="1329659" cy="830997"/>
-          </a:xfrm>
-          <a:prstGeom prst="rect">
-            <a:avLst/>
-          </a:prstGeom>
-          <a:noFill/>
-        </p:spPr>
-        <p:txBody>
-          <a:bodyPr wrap="none" rtlCol="0">
-            <a:spAutoFit/>
-          </a:bodyPr>
-          <a:lstStyle/>
-          <a:p>
-            <a:r>
-              <a:rPr lang="pt-BR" sz="1200" b="1" dirty="0">
-                <a:solidFill>
-                  <a:schemeClr val="accent5">
-                    <a:lumMod val="75000"/>
-                  </a:schemeClr>
-                </a:solidFill>
-              </a:rPr>
-              <a:t>Conexão Internet:</a:t>
-            </a:r>
-          </a:p>
-          <a:p>
-            <a:r>
-              <a:rPr lang="pt-BR" sz="1200" dirty="0"/>
-              <a:t>Roteador </a:t>
-            </a:r>
-            <a:r>
-              <a:rPr lang="pt-BR" sz="1200" dirty="0" err="1"/>
-              <a:t>Wi-fi</a:t>
-            </a:r>
-            <a:endParaRPr lang="pt-BR" sz="1200" dirty="0"/>
-          </a:p>
-          <a:p>
-            <a:r>
-              <a:rPr lang="pt-BR" sz="1200" dirty="0"/>
-              <a:t>Notebooks com IP</a:t>
-            </a:r>
-          </a:p>
-          <a:p>
-            <a:r>
-              <a:rPr lang="pt-BR" sz="1200" dirty="0"/>
-              <a:t>dinâmico</a:t>
-            </a:r>
-          </a:p>
-        </p:txBody>
-      </p:sp>
-      <p:sp>
-        <p:nvSpPr>
-          <p:cNvPr id="30" name="CaixaDeTexto 29">
-            <a:extLst>
-              <a:ext uri="{FF2B5EF4-FFF2-40B4-BE49-F238E27FC236}">
-                <a16:creationId xmlns:a16="http://schemas.microsoft.com/office/drawing/2014/main" id="{278873C1-8FCD-4A05-B8D8-0E0FE6E4A5E5}"/>
-              </a:ext>
-            </a:extLst>
-          </p:cNvPr>
-          <p:cNvSpPr txBox="1"/>
-          <p:nvPr/>
-        </p:nvSpPr>
-        <p:spPr>
-          <a:xfrm>
-            <a:off x="5979984" y="1623299"/>
-            <a:ext cx="852285" cy="369332"/>
-          </a:xfrm>
-          <a:prstGeom prst="rect">
-            <a:avLst/>
-          </a:prstGeom>
-          <a:solidFill>
-            <a:schemeClr val="bg1"/>
-          </a:solidFill>
-        </p:spPr>
-        <p:txBody>
-          <a:bodyPr wrap="none" rtlCol="0">
-            <a:spAutoFit/>
-          </a:bodyPr>
-          <a:lstStyle/>
-          <a:p>
-            <a:r>
-              <a:rPr lang="pt-BR" b="1" dirty="0">
-                <a:solidFill>
-                  <a:schemeClr val="accent5">
-                    <a:lumMod val="75000"/>
-                  </a:schemeClr>
-                </a:solidFill>
-              </a:rPr>
-              <a:t>CLOUD</a:t>
-            </a:r>
-            <a:endParaRPr lang="pt-BR" dirty="0"/>
-          </a:p>
-        </p:txBody>
-      </p:sp>
-      <p:sp>
-        <p:nvSpPr>
-          <p:cNvPr id="31" name="CaixaDeTexto 30">
-            <a:extLst>
-              <a:ext uri="{FF2B5EF4-FFF2-40B4-BE49-F238E27FC236}">
-                <a16:creationId xmlns:a16="http://schemas.microsoft.com/office/drawing/2014/main" id="{7E01ABC5-6897-457B-8B37-FCE53B99EA8B}"/>
-              </a:ext>
-            </a:extLst>
-          </p:cNvPr>
-          <p:cNvSpPr txBox="1"/>
-          <p:nvPr/>
-        </p:nvSpPr>
-        <p:spPr>
-          <a:xfrm>
-            <a:off x="956602" y="740144"/>
-            <a:ext cx="1346010" cy="369332"/>
-          </a:xfrm>
-          <a:prstGeom prst="rect">
-            <a:avLst/>
-          </a:prstGeom>
-          <a:solidFill>
-            <a:schemeClr val="bg1"/>
-          </a:solidFill>
-        </p:spPr>
-        <p:txBody>
-          <a:bodyPr wrap="none" rtlCol="0">
-            <a:spAutoFit/>
-          </a:bodyPr>
-          <a:lstStyle/>
-          <a:p>
-            <a:r>
-              <a:rPr lang="pt-BR" b="1" dirty="0">
-                <a:solidFill>
-                  <a:schemeClr val="accent5">
-                    <a:lumMod val="75000"/>
-                  </a:schemeClr>
-                </a:solidFill>
-              </a:rPr>
-              <a:t>REDE LOCAL</a:t>
-            </a:r>
-            <a:endParaRPr lang="pt-BR" dirty="0"/>
-          </a:p>
-        </p:txBody>
-      </p:sp>
-      <p:sp>
-        <p:nvSpPr>
-          <p:cNvPr id="32" name="CaixaDeTexto 31">
-            <a:extLst>
-              <a:ext uri="{FF2B5EF4-FFF2-40B4-BE49-F238E27FC236}">
-                <a16:creationId xmlns:a16="http://schemas.microsoft.com/office/drawing/2014/main" id="{BE46133A-D614-456B-8EE3-55FC873DB056}"/>
-              </a:ext>
-            </a:extLst>
-          </p:cNvPr>
-          <p:cNvSpPr txBox="1"/>
-          <p:nvPr/>
-        </p:nvSpPr>
-        <p:spPr>
-          <a:xfrm>
-            <a:off x="9937046" y="-74269"/>
-            <a:ext cx="2265813" cy="369332"/>
-          </a:xfrm>
-          <a:prstGeom prst="rect">
-            <a:avLst/>
-          </a:prstGeom>
-          <a:solidFill>
-            <a:schemeClr val="bg1"/>
-          </a:solidFill>
-        </p:spPr>
-        <p:txBody>
-          <a:bodyPr wrap="none" rtlCol="0">
-            <a:spAutoFit/>
-          </a:bodyPr>
-          <a:lstStyle/>
-          <a:p>
-            <a:r>
-              <a:rPr lang="pt-BR" b="1" dirty="0">
-                <a:solidFill>
-                  <a:schemeClr val="accent5">
-                    <a:lumMod val="75000"/>
-                  </a:schemeClr>
-                </a:solidFill>
-              </a:rPr>
-              <a:t>ACESSO A APLICAÇÃO</a:t>
-            </a:r>
-            <a:endParaRPr lang="pt-BR" dirty="0"/>
-          </a:p>
-        </p:txBody>
-      </p:sp>
-      <p:sp>
-        <p:nvSpPr>
-          <p:cNvPr id="33" name="CaixaDeTexto 32">
-            <a:extLst>
-              <a:ext uri="{FF2B5EF4-FFF2-40B4-BE49-F238E27FC236}">
-                <a16:creationId xmlns:a16="http://schemas.microsoft.com/office/drawing/2014/main" id="{DF370628-14BB-4F2A-8A5F-2A208E86F9C1}"/>
-              </a:ext>
-            </a:extLst>
-          </p:cNvPr>
-          <p:cNvSpPr txBox="1"/>
-          <p:nvPr/>
-        </p:nvSpPr>
-        <p:spPr>
-          <a:xfrm>
-            <a:off x="8990875" y="4877248"/>
-            <a:ext cx="2578142" cy="369332"/>
-          </a:xfrm>
-          <a:prstGeom prst="rect">
-            <a:avLst/>
-          </a:prstGeom>
-          <a:solidFill>
-            <a:schemeClr val="bg1"/>
-          </a:solidFill>
-        </p:spPr>
-        <p:txBody>
-          <a:bodyPr wrap="none" rtlCol="0">
-            <a:spAutoFit/>
-          </a:bodyPr>
-          <a:lstStyle/>
-          <a:p>
-            <a:r>
-              <a:rPr lang="pt-BR" b="1" dirty="0">
-                <a:solidFill>
-                  <a:schemeClr val="accent5">
-                    <a:lumMod val="75000"/>
-                  </a:schemeClr>
-                </a:solidFill>
-              </a:rPr>
-              <a:t>PROVEDOR DE INTERNET</a:t>
-            </a:r>
-          </a:p>
-        </p:txBody>
-      </p:sp>
-      <p:sp>
-        <p:nvSpPr>
-          <p:cNvPr id="34" name="CaixaDeTexto 33">
-            <a:extLst>
-              <a:ext uri="{FF2B5EF4-FFF2-40B4-BE49-F238E27FC236}">
-                <a16:creationId xmlns:a16="http://schemas.microsoft.com/office/drawing/2014/main" id="{5711E024-29C5-4603-AF43-280E587E0A01}"/>
-              </a:ext>
-            </a:extLst>
-          </p:cNvPr>
-          <p:cNvSpPr txBox="1"/>
-          <p:nvPr/>
-        </p:nvSpPr>
-        <p:spPr>
-          <a:xfrm>
-            <a:off x="1220145" y="4948556"/>
-            <a:ext cx="2578142" cy="369332"/>
-          </a:xfrm>
-          <a:prstGeom prst="rect">
-            <a:avLst/>
-          </a:prstGeom>
-          <a:solidFill>
-            <a:schemeClr val="bg1"/>
-          </a:solidFill>
-        </p:spPr>
-        <p:txBody>
-          <a:bodyPr wrap="none" rtlCol="0">
-            <a:spAutoFit/>
-          </a:bodyPr>
-          <a:lstStyle/>
-          <a:p>
-            <a:r>
-              <a:rPr lang="pt-BR" b="1" dirty="0">
-                <a:solidFill>
-                  <a:schemeClr val="accent5">
-                    <a:lumMod val="75000"/>
-                  </a:schemeClr>
-                </a:solidFill>
-              </a:rPr>
-              <a:t>PROVEDOR DE INTERNET</a:t>
-            </a:r>
-          </a:p>
-        </p:txBody>
-      </p:sp>
-      <p:pic>
-        <p:nvPicPr>
-          <p:cNvPr id="35" name="Imagem 34">
-            <a:extLst>
-              <a:ext uri="{FF2B5EF4-FFF2-40B4-BE49-F238E27FC236}">
-                <a16:creationId xmlns:a16="http://schemas.microsoft.com/office/drawing/2014/main" id="{3F3A9C18-11B5-4C95-87DC-520764F3BCD5}"/>
-              </a:ext>
-            </a:extLst>
-          </p:cNvPr>
-          <p:cNvPicPr>
-            <a:picLocks noChangeAspect="1"/>
-          </p:cNvPicPr>
-          <p:nvPr/>
-        </p:nvPicPr>
-        <p:blipFill>
-          <a:blip r:embed="rId9" cstate="hqprint">
-            <a:extLst>
-              <a:ext uri="{28A0092B-C50C-407E-A947-70E740481C1C}">
-                <a14:useLocalDpi xmlns:a14="http://schemas.microsoft.com/office/drawing/2010/main" val="0"/>
-              </a:ext>
-            </a:extLst>
-          </a:blip>
-          <a:stretch>
-            <a:fillRect/>
-          </a:stretch>
-        </p:blipFill>
-        <p:spPr>
-          <a:xfrm>
-            <a:off x="6913441" y="4427759"/>
-            <a:ext cx="524728" cy="524728"/>
-          </a:xfrm>
-          <a:prstGeom prst="rect">
-            <a:avLst/>
-          </a:prstGeom>
-        </p:spPr>
-      </p:pic>
-      <p:pic>
-        <p:nvPicPr>
-          <p:cNvPr id="36" name="Imagem 35">
-            <a:extLst>
-              <a:ext uri="{FF2B5EF4-FFF2-40B4-BE49-F238E27FC236}">
-                <a16:creationId xmlns:a16="http://schemas.microsoft.com/office/drawing/2014/main" id="{CCC2F36A-CD9D-4A46-8724-655BE328DBC8}"/>
-              </a:ext>
-            </a:extLst>
-          </p:cNvPr>
-          <p:cNvPicPr>
-            <a:picLocks noChangeAspect="1"/>
-          </p:cNvPicPr>
-          <p:nvPr/>
-        </p:nvPicPr>
-        <p:blipFill rotWithShape="1">
-          <a:blip r:embed="rId10" cstate="print">
-            <a:extLst>
-              <a:ext uri="{28A0092B-C50C-407E-A947-70E740481C1C}">
-                <a14:useLocalDpi xmlns:a14="http://schemas.microsoft.com/office/drawing/2010/main" val="0"/>
-              </a:ext>
-            </a:extLst>
-          </a:blip>
-          <a:srcRect l="21288" t="22015"/>
-          <a:stretch/>
-        </p:blipFill>
-        <p:spPr>
-          <a:xfrm>
-            <a:off x="5364000" y="4416702"/>
-            <a:ext cx="510200" cy="505492"/>
-          </a:xfrm>
-          <a:prstGeom prst="rect">
-            <a:avLst/>
-          </a:prstGeom>
-        </p:spPr>
-      </p:pic>
-      <p:pic>
-        <p:nvPicPr>
-          <p:cNvPr id="37" name="Imagem 36">
-            <a:extLst>
-              <a:ext uri="{FF2B5EF4-FFF2-40B4-BE49-F238E27FC236}">
-                <a16:creationId xmlns:a16="http://schemas.microsoft.com/office/drawing/2014/main" id="{667CAF5F-B050-4A89-93A8-F95337F244A2}"/>
-              </a:ext>
-            </a:extLst>
-          </p:cNvPr>
-          <p:cNvPicPr>
-            <a:picLocks noChangeAspect="1"/>
-          </p:cNvPicPr>
-          <p:nvPr/>
-        </p:nvPicPr>
-        <p:blipFill>
-          <a:blip r:embed="rId7" cstate="print">
-            <a:extLst>
-              <a:ext uri="{28A0092B-C50C-407E-A947-70E740481C1C}">
-                <a14:useLocalDpi xmlns:a14="http://schemas.microsoft.com/office/drawing/2010/main" val="0"/>
-              </a:ext>
-            </a:extLst>
-          </a:blip>
-          <a:stretch>
-            <a:fillRect/>
-          </a:stretch>
-        </p:blipFill>
-        <p:spPr>
-          <a:xfrm>
-            <a:off x="9140848" y="2949987"/>
-            <a:ext cx="1452338" cy="1452338"/>
-          </a:xfrm>
-          <a:prstGeom prst="rect">
-            <a:avLst/>
-          </a:prstGeom>
-        </p:spPr>
-      </p:pic>
-      <p:sp>
-        <p:nvSpPr>
-          <p:cNvPr id="38" name="CaixaDeTexto 37">
-            <a:extLst>
-              <a:ext uri="{FF2B5EF4-FFF2-40B4-BE49-F238E27FC236}">
-                <a16:creationId xmlns:a16="http://schemas.microsoft.com/office/drawing/2014/main" id="{FDBDB72D-13EC-4A0B-9992-26333CB0F016}"/>
-              </a:ext>
-            </a:extLst>
-          </p:cNvPr>
-          <p:cNvSpPr txBox="1"/>
-          <p:nvPr/>
-        </p:nvSpPr>
-        <p:spPr>
-          <a:xfrm>
-            <a:off x="11427343" y="524366"/>
-            <a:ext cx="603050" cy="276999"/>
-          </a:xfrm>
-          <a:prstGeom prst="rect">
-            <a:avLst/>
-          </a:prstGeom>
-          <a:noFill/>
-        </p:spPr>
-        <p:txBody>
-          <a:bodyPr wrap="none" rtlCol="0">
-            <a:spAutoFit/>
-          </a:bodyPr>
-          <a:lstStyle/>
-          <a:p>
-            <a:r>
-              <a:rPr lang="pt-BR" sz="1200" b="1" dirty="0"/>
-              <a:t>3G/4G</a:t>
-            </a:r>
-          </a:p>
-        </p:txBody>
-      </p:sp>
-      <p:pic>
-        <p:nvPicPr>
-          <p:cNvPr id="39" name="Imagem 38">
-            <a:extLst>
-              <a:ext uri="{FF2B5EF4-FFF2-40B4-BE49-F238E27FC236}">
-                <a16:creationId xmlns:a16="http://schemas.microsoft.com/office/drawing/2014/main" id="{802D34E9-4261-4BE5-95DA-9C57C385E438}"/>
-              </a:ext>
-            </a:extLst>
-          </p:cNvPr>
-          <p:cNvPicPr>
-            <a:picLocks noChangeAspect="1"/>
-          </p:cNvPicPr>
-          <p:nvPr/>
-        </p:nvPicPr>
-        <p:blipFill>
-          <a:blip r:embed="rId11" cstate="print">
-            <a:extLst>
-              <a:ext uri="{28A0092B-C50C-407E-A947-70E740481C1C}">
-                <a14:useLocalDpi xmlns:a14="http://schemas.microsoft.com/office/drawing/2010/main" val="0"/>
-              </a:ext>
-            </a:extLst>
-          </a:blip>
-          <a:stretch>
-            <a:fillRect/>
-          </a:stretch>
-        </p:blipFill>
-        <p:spPr>
-          <a:xfrm>
-            <a:off x="4723699" y="4738554"/>
-            <a:ext cx="897951" cy="897951"/>
-          </a:xfrm>
-          <a:prstGeom prst="rect">
-            <a:avLst/>
-          </a:prstGeom>
-        </p:spPr>
-      </p:pic>
-      <p:pic>
-        <p:nvPicPr>
-          <p:cNvPr id="40" name="Imagem 39">
-            <a:extLst>
-              <a:ext uri="{FF2B5EF4-FFF2-40B4-BE49-F238E27FC236}">
-                <a16:creationId xmlns:a16="http://schemas.microsoft.com/office/drawing/2014/main" id="{C2DB72EF-ADBD-41D7-AE9F-0B5FF6E1B645}"/>
-              </a:ext>
-            </a:extLst>
-          </p:cNvPr>
-          <p:cNvPicPr>
-            <a:picLocks noChangeAspect="1"/>
-          </p:cNvPicPr>
-          <p:nvPr/>
-        </p:nvPicPr>
-        <p:blipFill>
-          <a:blip r:embed="rId12">
-            <a:extLst>
-              <a:ext uri="{28A0092B-C50C-407E-A947-70E740481C1C}">
-                <a14:useLocalDpi xmlns:a14="http://schemas.microsoft.com/office/drawing/2010/main" val="0"/>
-              </a:ext>
-            </a:extLst>
-          </a:blip>
-          <a:stretch>
-            <a:fillRect/>
-          </a:stretch>
-        </p:blipFill>
-        <p:spPr>
-          <a:xfrm>
-            <a:off x="7193768" y="4742754"/>
-            <a:ext cx="1418817" cy="780349"/>
-          </a:xfrm>
-          <a:prstGeom prst="rect">
-            <a:avLst/>
-          </a:prstGeom>
-        </p:spPr>
-      </p:pic>
-      <p:cxnSp>
-        <p:nvCxnSpPr>
-          <p:cNvPr id="41" name="Conector em curva 53">
-            <a:extLst>
-              <a:ext uri="{FF2B5EF4-FFF2-40B4-BE49-F238E27FC236}">
-                <a16:creationId xmlns:a16="http://schemas.microsoft.com/office/drawing/2014/main" id="{6A9CE8FF-ED9D-4C51-99C6-83ED5F37E104}"/>
-              </a:ext>
-            </a:extLst>
-          </p:cNvPr>
-          <p:cNvCxnSpPr>
-            <a:cxnSpLocks/>
-            <a:stCxn id="51" idx="3"/>
-            <a:endCxn id="26" idx="1"/>
-          </p:cNvCxnSpPr>
-          <p:nvPr/>
-        </p:nvCxnSpPr>
-        <p:spPr>
-          <a:xfrm>
-            <a:off x="11535839" y="2477108"/>
-            <a:ext cx="260589" cy="3578573"/>
-          </a:xfrm>
-          <a:prstGeom prst="curvedConnector3">
-            <a:avLst>
-              <a:gd name="adj1" fmla="val 187724"/>
-            </a:avLst>
-          </a:prstGeom>
-          <a:ln w="38100">
-            <a:solidFill>
-              <a:schemeClr val="accent5">
-                <a:lumMod val="75000"/>
-              </a:schemeClr>
-            </a:solidFill>
-            <a:headEnd type="triangle"/>
-            <a:tailEnd type="triangle"/>
-          </a:ln>
-        </p:spPr>
-        <p:style>
-          <a:lnRef idx="1">
-            <a:schemeClr val="accent1"/>
-          </a:lnRef>
-          <a:fillRef idx="0">
-            <a:schemeClr val="accent1"/>
-          </a:fillRef>
-          <a:effectRef idx="0">
-            <a:schemeClr val="accent1"/>
-          </a:effectRef>
-          <a:fontRef idx="minor">
-            <a:schemeClr val="tx1"/>
-          </a:fontRef>
-        </p:style>
-      </p:cxnSp>
-      <p:pic>
-        <p:nvPicPr>
-          <p:cNvPr id="42" name="Imagem 41">
-            <a:extLst>
-              <a:ext uri="{FF2B5EF4-FFF2-40B4-BE49-F238E27FC236}">
-                <a16:creationId xmlns:a16="http://schemas.microsoft.com/office/drawing/2014/main" id="{7B6FC6B2-B708-48CB-9821-0E349A092DBA}"/>
-              </a:ext>
-            </a:extLst>
-          </p:cNvPr>
-          <p:cNvPicPr>
-            <a:picLocks noChangeAspect="1"/>
-          </p:cNvPicPr>
-          <p:nvPr/>
-        </p:nvPicPr>
-        <p:blipFill>
-          <a:blip r:embed="rId13" cstate="print">
-            <a:extLst>
-              <a:ext uri="{28A0092B-C50C-407E-A947-70E740481C1C}">
-                <a14:useLocalDpi xmlns:a14="http://schemas.microsoft.com/office/drawing/2010/main" val="0"/>
-              </a:ext>
-            </a:extLst>
-          </a:blip>
-          <a:stretch>
-            <a:fillRect/>
-          </a:stretch>
-        </p:blipFill>
-        <p:spPr>
-          <a:xfrm>
-            <a:off x="516835" y="2791739"/>
-            <a:ext cx="491277" cy="491277"/>
-          </a:xfrm>
-          <a:prstGeom prst="rect">
-            <a:avLst/>
-          </a:prstGeom>
-        </p:spPr>
-      </p:pic>
-      <p:pic>
-        <p:nvPicPr>
-          <p:cNvPr id="43" name="Imagem 42">
-            <a:extLst>
-              <a:ext uri="{FF2B5EF4-FFF2-40B4-BE49-F238E27FC236}">
-                <a16:creationId xmlns:a16="http://schemas.microsoft.com/office/drawing/2014/main" id="{0DFE9CB4-9439-41C4-A914-5F5019D64C72}"/>
-              </a:ext>
-            </a:extLst>
-          </p:cNvPr>
-          <p:cNvPicPr>
-            <a:picLocks noChangeAspect="1"/>
-          </p:cNvPicPr>
-          <p:nvPr/>
-        </p:nvPicPr>
-        <p:blipFill>
-          <a:blip r:embed="rId14" cstate="print">
-            <a:extLst>
-              <a:ext uri="{28A0092B-C50C-407E-A947-70E740481C1C}">
-                <a14:useLocalDpi xmlns:a14="http://schemas.microsoft.com/office/drawing/2010/main" val="0"/>
-              </a:ext>
-            </a:extLst>
-          </a:blip>
-          <a:stretch>
-            <a:fillRect/>
-          </a:stretch>
-        </p:blipFill>
-        <p:spPr>
-          <a:xfrm>
-            <a:off x="9074898" y="470872"/>
-            <a:ext cx="1203332" cy="1031427"/>
-          </a:xfrm>
-          <a:prstGeom prst="rect">
-            <a:avLst/>
-          </a:prstGeom>
-        </p:spPr>
-      </p:pic>
-      <p:cxnSp>
-        <p:nvCxnSpPr>
-          <p:cNvPr id="44" name="Conector em curva 40">
-            <a:extLst>
-              <a:ext uri="{FF2B5EF4-FFF2-40B4-BE49-F238E27FC236}">
-                <a16:creationId xmlns:a16="http://schemas.microsoft.com/office/drawing/2014/main" id="{AC85410C-F0FF-4E5D-806A-A07941F36B35}"/>
-              </a:ext>
-            </a:extLst>
-          </p:cNvPr>
-          <p:cNvCxnSpPr>
-            <a:cxnSpLocks/>
-            <a:stCxn id="43" idx="3"/>
-            <a:endCxn id="51" idx="1"/>
-          </p:cNvCxnSpPr>
-          <p:nvPr/>
-        </p:nvCxnSpPr>
-        <p:spPr>
-          <a:xfrm>
-            <a:off x="10278230" y="986586"/>
-            <a:ext cx="648426" cy="1490522"/>
-          </a:xfrm>
-          <a:prstGeom prst="curvedConnector3">
-            <a:avLst>
-              <a:gd name="adj1" fmla="val 50000"/>
-            </a:avLst>
-          </a:prstGeom>
-          <a:ln w="38100">
-            <a:solidFill>
-              <a:srgbClr val="0070C0"/>
-            </a:solidFill>
-            <a:headEnd type="triangle"/>
-            <a:tailEnd type="triangle"/>
-          </a:ln>
-        </p:spPr>
-        <p:style>
-          <a:lnRef idx="1">
-            <a:schemeClr val="accent1"/>
-          </a:lnRef>
-          <a:fillRef idx="0">
-            <a:schemeClr val="accent1"/>
-          </a:fillRef>
-          <a:effectRef idx="0">
-            <a:schemeClr val="accent1"/>
-          </a:effectRef>
-          <a:fontRef idx="minor">
-            <a:schemeClr val="tx1"/>
-          </a:fontRef>
-        </p:style>
-      </p:cxnSp>
-      <p:pic>
-        <p:nvPicPr>
-          <p:cNvPr id="45" name="Imagem 44">
-            <a:extLst>
-              <a:ext uri="{FF2B5EF4-FFF2-40B4-BE49-F238E27FC236}">
-                <a16:creationId xmlns:a16="http://schemas.microsoft.com/office/drawing/2014/main" id="{C044BFEC-A6F3-49E7-B231-FE87F58405A0}"/>
-              </a:ext>
-            </a:extLst>
-          </p:cNvPr>
-          <p:cNvPicPr>
-            <a:picLocks noChangeAspect="1"/>
-          </p:cNvPicPr>
-          <p:nvPr/>
-        </p:nvPicPr>
-        <p:blipFill rotWithShape="1">
-          <a:blip r:embed="rId15"/>
-          <a:srcRect t="14112" r="1828" b="5849"/>
-          <a:stretch/>
-        </p:blipFill>
-        <p:spPr>
-          <a:xfrm>
-            <a:off x="9314057" y="3191193"/>
-            <a:ext cx="1056863" cy="613095"/>
-          </a:xfrm>
-          <a:prstGeom prst="rect">
-            <a:avLst/>
-          </a:prstGeom>
-        </p:spPr>
-      </p:pic>
-      <p:cxnSp>
-        <p:nvCxnSpPr>
-          <p:cNvPr id="46" name="Conector em curva 79">
-            <a:extLst>
-              <a:ext uri="{FF2B5EF4-FFF2-40B4-BE49-F238E27FC236}">
-                <a16:creationId xmlns:a16="http://schemas.microsoft.com/office/drawing/2014/main" id="{85E4DB77-D6AA-4D23-B8F8-502268255B99}"/>
-              </a:ext>
-            </a:extLst>
-          </p:cNvPr>
-          <p:cNvCxnSpPr>
-            <a:cxnSpLocks/>
-            <a:stCxn id="9" idx="3"/>
-            <a:endCxn id="51" idx="0"/>
-          </p:cNvCxnSpPr>
-          <p:nvPr/>
-        </p:nvCxnSpPr>
-        <p:spPr>
-          <a:xfrm flipH="1">
-            <a:off x="11231248" y="1002036"/>
-            <a:ext cx="338291" cy="1170480"/>
-          </a:xfrm>
-          <a:prstGeom prst="curvedConnector4">
-            <a:avLst>
-              <a:gd name="adj1" fmla="val -67575"/>
-              <a:gd name="adj2" fmla="val 71646"/>
-            </a:avLst>
-          </a:prstGeom>
-          <a:ln w="38100">
-            <a:solidFill>
-              <a:srgbClr val="0070C0"/>
-            </a:solidFill>
-            <a:headEnd type="triangle"/>
-            <a:tailEnd type="triangle"/>
-          </a:ln>
-        </p:spPr>
-        <p:style>
-          <a:lnRef idx="1">
-            <a:schemeClr val="accent1"/>
-          </a:lnRef>
-          <a:fillRef idx="0">
-            <a:schemeClr val="accent1"/>
-          </a:fillRef>
-          <a:effectRef idx="0">
-            <a:schemeClr val="accent1"/>
-          </a:effectRef>
-          <a:fontRef idx="minor">
-            <a:schemeClr val="tx1"/>
-          </a:fontRef>
-        </p:style>
-      </p:cxnSp>
-      <p:cxnSp>
-        <p:nvCxnSpPr>
-          <p:cNvPr id="47" name="Conector em curva 86">
-            <a:extLst>
-              <a:ext uri="{FF2B5EF4-FFF2-40B4-BE49-F238E27FC236}">
-                <a16:creationId xmlns:a16="http://schemas.microsoft.com/office/drawing/2014/main" id="{F81B07D5-73F6-4CAE-AEE4-C349993CB6F0}"/>
-              </a:ext>
-            </a:extLst>
-          </p:cNvPr>
-          <p:cNvCxnSpPr>
-            <a:stCxn id="48" idx="2"/>
-            <a:endCxn id="16" idx="1"/>
-          </p:cNvCxnSpPr>
-          <p:nvPr/>
-        </p:nvCxnSpPr>
-        <p:spPr>
-          <a:xfrm rot="16200000" flipH="1">
-            <a:off x="401488" y="5338102"/>
-            <a:ext cx="1272551" cy="185335"/>
-          </a:xfrm>
-          <a:prstGeom prst="curvedConnector2">
-            <a:avLst/>
-          </a:prstGeom>
-          <a:ln w="38100">
-            <a:solidFill>
-              <a:schemeClr val="accent5">
-                <a:lumMod val="75000"/>
-              </a:schemeClr>
-            </a:solidFill>
-            <a:headEnd type="triangle"/>
-            <a:tailEnd type="triangle"/>
-          </a:ln>
-        </p:spPr>
-        <p:style>
-          <a:lnRef idx="1">
-            <a:schemeClr val="accent1"/>
-          </a:lnRef>
-          <a:fillRef idx="0">
-            <a:schemeClr val="accent1"/>
-          </a:fillRef>
-          <a:effectRef idx="0">
-            <a:schemeClr val="accent1"/>
-          </a:effectRef>
-          <a:fontRef idx="minor">
-            <a:schemeClr val="tx1"/>
-          </a:fontRef>
-        </p:style>
-      </p:cxnSp>
-      <p:pic>
-        <p:nvPicPr>
-          <p:cNvPr id="48" name="Imagem 47">
-            <a:extLst>
-              <a:ext uri="{FF2B5EF4-FFF2-40B4-BE49-F238E27FC236}">
-                <a16:creationId xmlns:a16="http://schemas.microsoft.com/office/drawing/2014/main" id="{DB74EB99-E8EF-42B0-9B48-3A25F7AC84DC}"/>
-              </a:ext>
-            </a:extLst>
-          </p:cNvPr>
-          <p:cNvPicPr>
-            <a:picLocks noChangeAspect="1"/>
-          </p:cNvPicPr>
-          <p:nvPr/>
-        </p:nvPicPr>
-        <p:blipFill>
-          <a:blip r:embed="rId16">
-            <a:extLst>
-              <a:ext uri="{28A0092B-C50C-407E-A947-70E740481C1C}">
-                <a14:useLocalDpi xmlns:a14="http://schemas.microsoft.com/office/drawing/2010/main" val="0"/>
-              </a:ext>
-            </a:extLst>
-          </a:blip>
-          <a:stretch>
-            <a:fillRect/>
-          </a:stretch>
-        </p:blipFill>
-        <p:spPr>
-          <a:xfrm>
-            <a:off x="651956" y="4208216"/>
-            <a:ext cx="586279" cy="586279"/>
-          </a:xfrm>
-          <a:prstGeom prst="rect">
-            <a:avLst/>
-          </a:prstGeom>
-        </p:spPr>
-      </p:pic>
-      <p:pic>
-        <p:nvPicPr>
-          <p:cNvPr id="49" name="Imagem 48">
-            <a:extLst>
-              <a:ext uri="{FF2B5EF4-FFF2-40B4-BE49-F238E27FC236}">
-                <a16:creationId xmlns:a16="http://schemas.microsoft.com/office/drawing/2014/main" id="{DDD8F92F-A68E-4F30-8E5D-B7FAA1961408}"/>
-              </a:ext>
-            </a:extLst>
-          </p:cNvPr>
-          <p:cNvPicPr>
-            <a:picLocks noChangeAspect="1"/>
-          </p:cNvPicPr>
-          <p:nvPr/>
-        </p:nvPicPr>
-        <p:blipFill>
-          <a:blip r:embed="rId17">
-            <a:extLst>
-              <a:ext uri="{28A0092B-C50C-407E-A947-70E740481C1C}">
-                <a14:useLocalDpi xmlns:a14="http://schemas.microsoft.com/office/drawing/2010/main" val="0"/>
-              </a:ext>
-            </a:extLst>
-          </a:blip>
-          <a:stretch>
-            <a:fillRect/>
-          </a:stretch>
-        </p:blipFill>
-        <p:spPr>
-          <a:xfrm>
-            <a:off x="2647869" y="5859945"/>
-            <a:ext cx="1198111" cy="1198111"/>
-          </a:xfrm>
-          <a:prstGeom prst="rect">
-            <a:avLst/>
-          </a:prstGeom>
-        </p:spPr>
-      </p:pic>
-      <p:sp>
-        <p:nvSpPr>
-          <p:cNvPr id="50" name="CaixaDeTexto 49">
-            <a:extLst>
-              <a:ext uri="{FF2B5EF4-FFF2-40B4-BE49-F238E27FC236}">
-                <a16:creationId xmlns:a16="http://schemas.microsoft.com/office/drawing/2014/main" id="{58510C22-4E1F-44D4-9E53-3AD0AA26E0A3}"/>
-              </a:ext>
-            </a:extLst>
-          </p:cNvPr>
-          <p:cNvSpPr txBox="1"/>
-          <p:nvPr/>
-        </p:nvSpPr>
-        <p:spPr>
-          <a:xfrm>
-            <a:off x="2938144" y="6189199"/>
-            <a:ext cx="607346" cy="369332"/>
-          </a:xfrm>
-          <a:prstGeom prst="rect">
-            <a:avLst/>
-          </a:prstGeom>
-          <a:noFill/>
-        </p:spPr>
-        <p:txBody>
-          <a:bodyPr wrap="none" rtlCol="0">
-            <a:spAutoFit/>
-          </a:bodyPr>
-          <a:lstStyle/>
-          <a:p>
-            <a:r>
-              <a:rPr lang="pt-BR" b="1" dirty="0">
-                <a:solidFill>
-                  <a:schemeClr val="accent5">
-                    <a:lumMod val="75000"/>
-                  </a:schemeClr>
-                </a:solidFill>
-              </a:rPr>
-              <a:t>Vivo</a:t>
-            </a:r>
-          </a:p>
-        </p:txBody>
-      </p:sp>
-      <p:pic>
-        <p:nvPicPr>
-          <p:cNvPr id="51" name="Imagem 50">
-            <a:extLst>
-              <a:ext uri="{FF2B5EF4-FFF2-40B4-BE49-F238E27FC236}">
-                <a16:creationId xmlns:a16="http://schemas.microsoft.com/office/drawing/2014/main" id="{14BF3035-349D-46C7-AE71-8ABF0EA80F8A}"/>
-              </a:ext>
-            </a:extLst>
-          </p:cNvPr>
-          <p:cNvPicPr>
-            <a:picLocks noChangeAspect="1"/>
-          </p:cNvPicPr>
-          <p:nvPr/>
-        </p:nvPicPr>
-        <p:blipFill>
-          <a:blip r:embed="rId16">
-            <a:extLst>
-              <a:ext uri="{28A0092B-C50C-407E-A947-70E740481C1C}">
-                <a14:useLocalDpi xmlns:a14="http://schemas.microsoft.com/office/drawing/2010/main" val="0"/>
-              </a:ext>
-            </a:extLst>
-          </a:blip>
-          <a:stretch>
-            <a:fillRect/>
-          </a:stretch>
-        </p:blipFill>
-        <p:spPr>
-          <a:xfrm>
-            <a:off x="10926656" y="2172516"/>
-            <a:ext cx="609183" cy="609183"/>
-          </a:xfrm>
-          <a:prstGeom prst="rect">
-            <a:avLst/>
-          </a:prstGeom>
-        </p:spPr>
-      </p:pic>
-      <p:pic>
-        <p:nvPicPr>
-          <p:cNvPr id="52" name="Imagem 51">
-            <a:extLst>
-              <a:ext uri="{FF2B5EF4-FFF2-40B4-BE49-F238E27FC236}">
-                <a16:creationId xmlns:a16="http://schemas.microsoft.com/office/drawing/2014/main" id="{0779DFE7-3018-496C-BF16-45DE067723E3}"/>
-              </a:ext>
-            </a:extLst>
-          </p:cNvPr>
-          <p:cNvPicPr>
-            <a:picLocks noChangeAspect="1"/>
-          </p:cNvPicPr>
-          <p:nvPr/>
-        </p:nvPicPr>
-        <p:blipFill>
-          <a:blip r:embed="rId17">
-            <a:extLst>
-              <a:ext uri="{28A0092B-C50C-407E-A947-70E740481C1C}">
-                <a14:useLocalDpi xmlns:a14="http://schemas.microsoft.com/office/drawing/2010/main" val="0"/>
-              </a:ext>
-            </a:extLst>
-          </a:blip>
-          <a:stretch>
-            <a:fillRect/>
-          </a:stretch>
-        </p:blipFill>
-        <p:spPr>
-          <a:xfrm>
-            <a:off x="9021808" y="5684780"/>
-            <a:ext cx="1198111" cy="1198111"/>
-          </a:xfrm>
-          <a:prstGeom prst="rect">
-            <a:avLst/>
-          </a:prstGeom>
-        </p:spPr>
-      </p:pic>
-      <p:sp>
-        <p:nvSpPr>
-          <p:cNvPr id="53" name="CaixaDeTexto 52">
-            <a:extLst>
-              <a:ext uri="{FF2B5EF4-FFF2-40B4-BE49-F238E27FC236}">
-                <a16:creationId xmlns:a16="http://schemas.microsoft.com/office/drawing/2014/main" id="{28A61049-9F54-48D7-BAAE-56C7DCB0DEA8}"/>
-              </a:ext>
-            </a:extLst>
-          </p:cNvPr>
-          <p:cNvSpPr txBox="1"/>
-          <p:nvPr/>
-        </p:nvSpPr>
-        <p:spPr>
-          <a:xfrm>
-            <a:off x="9334698" y="6050227"/>
-            <a:ext cx="542136" cy="369332"/>
-          </a:xfrm>
-          <a:prstGeom prst="rect">
-            <a:avLst/>
-          </a:prstGeom>
-          <a:noFill/>
-        </p:spPr>
-        <p:txBody>
-          <a:bodyPr wrap="none" rtlCol="0">
-            <a:spAutoFit/>
-          </a:bodyPr>
-          <a:lstStyle/>
-          <a:p>
-            <a:r>
-              <a:rPr lang="pt-BR" b="1" dirty="0">
-                <a:solidFill>
-                  <a:schemeClr val="accent5">
-                    <a:lumMod val="75000"/>
-                  </a:schemeClr>
-                </a:solidFill>
-              </a:rPr>
-              <a:t>Tim</a:t>
-            </a:r>
-          </a:p>
-        </p:txBody>
-      </p:sp>
-      <p:sp>
-        <p:nvSpPr>
-          <p:cNvPr id="54" name="Retângulo 53">
-            <a:extLst>
-              <a:ext uri="{FF2B5EF4-FFF2-40B4-BE49-F238E27FC236}">
-                <a16:creationId xmlns:a16="http://schemas.microsoft.com/office/drawing/2014/main" id="{C0334C44-9842-4C47-B827-46EE76ED1BEC}"/>
-              </a:ext>
-            </a:extLst>
-          </p:cNvPr>
-          <p:cNvSpPr/>
-          <p:nvPr/>
-        </p:nvSpPr>
-        <p:spPr>
-          <a:xfrm>
-            <a:off x="92770" y="179994"/>
-            <a:ext cx="4961829" cy="523220"/>
-          </a:xfrm>
-          <a:prstGeom prst="rect">
-            <a:avLst/>
-          </a:prstGeom>
-        </p:spPr>
-        <p:txBody>
-          <a:bodyPr wrap="square">
-            <a:spAutoFit/>
-          </a:bodyPr>
-          <a:lstStyle/>
-          <a:p>
-            <a:r>
-              <a:rPr lang="pt-BR" sz="2800" b="1" dirty="0">
-                <a:solidFill>
-                  <a:schemeClr val="accent5">
-                    <a:lumMod val="75000"/>
-                  </a:schemeClr>
-                </a:solidFill>
-                <a:latin typeface="Roboto" pitchFamily="2" charset="0"/>
-                <a:ea typeface="Roboto" pitchFamily="2" charset="0"/>
-              </a:rPr>
-              <a:t>Desenho da Solução</a:t>
-            </a:r>
-          </a:p>
-        </p:txBody>
-      </p:sp>
-      <p:sp>
-        <p:nvSpPr>
-          <p:cNvPr id="55" name="CaixaDeTexto 54">
-            <a:extLst>
-              <a:ext uri="{FF2B5EF4-FFF2-40B4-BE49-F238E27FC236}">
-                <a16:creationId xmlns:a16="http://schemas.microsoft.com/office/drawing/2014/main" id="{7591475A-C065-4BB2-887A-453A1CB83A90}"/>
-              </a:ext>
-            </a:extLst>
-          </p:cNvPr>
-          <p:cNvSpPr txBox="1"/>
-          <p:nvPr/>
-        </p:nvSpPr>
-        <p:spPr>
-          <a:xfrm>
-            <a:off x="4473377" y="2114611"/>
-            <a:ext cx="1766838" cy="1754326"/>
-          </a:xfrm>
-          <a:prstGeom prst="rect">
-            <a:avLst/>
-          </a:prstGeom>
-          <a:noFill/>
-        </p:spPr>
-        <p:txBody>
-          <a:bodyPr wrap="square" rtlCol="0">
-            <a:spAutoFit/>
-          </a:bodyPr>
-          <a:lstStyle/>
-          <a:p>
-            <a:r>
-              <a:rPr lang="pt-BR" sz="1200" b="1" dirty="0">
-                <a:solidFill>
-                  <a:schemeClr val="accent5">
-                    <a:lumMod val="75000"/>
-                  </a:schemeClr>
-                </a:solidFill>
-              </a:rPr>
-              <a:t>Máquina Virtual</a:t>
-            </a:r>
-          </a:p>
-          <a:p>
-            <a:r>
-              <a:rPr lang="pt-BR" sz="1200" dirty="0"/>
-              <a:t>SO: Debian 9</a:t>
-            </a:r>
-          </a:p>
-          <a:p>
-            <a:r>
-              <a:rPr lang="pt-BR" sz="1200" dirty="0" err="1"/>
-              <a:t>vCPU</a:t>
-            </a:r>
-            <a:r>
-              <a:rPr lang="pt-BR" sz="1200" dirty="0"/>
-              <a:t>: 1</a:t>
-            </a:r>
-          </a:p>
-          <a:p>
-            <a:r>
-              <a:rPr lang="pt-BR" sz="1200" dirty="0"/>
-              <a:t>RAM (</a:t>
-            </a:r>
-            <a:r>
-              <a:rPr lang="pt-BR" sz="1200" dirty="0" err="1"/>
-              <a:t>GiB</a:t>
-            </a:r>
-            <a:r>
-              <a:rPr lang="pt-BR" sz="1200" dirty="0"/>
-              <a:t>): 0,5</a:t>
-            </a:r>
-          </a:p>
-          <a:p>
-            <a:r>
-              <a:rPr lang="pt-BR" sz="1200" dirty="0"/>
-              <a:t>Disco de Dados: 2</a:t>
-            </a:r>
-          </a:p>
-          <a:p>
-            <a:r>
-              <a:rPr lang="pt-BR" sz="1200" dirty="0"/>
-              <a:t>IOPS (</a:t>
-            </a:r>
-            <a:r>
-              <a:rPr lang="pt-BR" sz="1200" dirty="0" err="1"/>
-              <a:t>máx</a:t>
-            </a:r>
-            <a:r>
-              <a:rPr lang="pt-BR" sz="1200" dirty="0"/>
-              <a:t>): 200</a:t>
-            </a:r>
-          </a:p>
-          <a:p>
-            <a:r>
-              <a:rPr lang="pt-BR" sz="1200" dirty="0"/>
-              <a:t>Armazenamento: 4GB</a:t>
-            </a:r>
-          </a:p>
-          <a:p>
-            <a:r>
-              <a:rPr lang="pt-BR" sz="1200" dirty="0"/>
-              <a:t>Custo mensal: R$ 14,57</a:t>
-            </a:r>
-          </a:p>
-          <a:p>
-            <a:r>
-              <a:rPr lang="pt-BR" sz="1200" dirty="0"/>
-              <a:t>Locado: Leste EUA</a:t>
-            </a:r>
-          </a:p>
-        </p:txBody>
-      </p:sp>
-    </p:spTree>
-    <p:extLst>
-      <p:ext uri="{BB962C8B-B14F-4D97-AF65-F5344CB8AC3E}">
-        <p14:creationId xmlns:p14="http://schemas.microsoft.com/office/powerpoint/2010/main" val="1652313719"/>
-      </p:ext>
-    </p:extLst>
-  </p:cSld>
-  <p:clrMapOvr>
-    <a:masterClrMapping/>
-  </p:clrMapOvr>
-  <p:timing>
-    <p:tnLst>
-      <p:par>
-        <p:cTn id="1" dur="indefinite" restart="never" nodeType="tmRoot"/>
-      </p:par>
-    </p:tnLst>
-  </p:timing>
-</p:sld>
-</file>
-
 <file path=ppt/theme/theme1.xml><?xml version="1.0" encoding="utf-8"?>
 <a:theme xmlns:a="http://schemas.openxmlformats.org/drawingml/2006/main" name="Tema do Office">
   <a:themeElements>

</xml_diff>